<commit_message>
Clean wire frame with flow and display functionality
</commit_message>
<xml_diff>
--- a/presentation/CRM - LITE.pptx
+++ b/presentation/CRM - LITE.pptx
@@ -5,7 +5,7 @@
     <p:sldMasterId id="2147483648" r:id="rId1"/>
   </p:sldMasterIdLst>
   <p:notesMasterIdLst>
-    <p:notesMasterId r:id="rId9"/>
+    <p:notesMasterId r:id="rId13"/>
   </p:notesMasterIdLst>
   <p:sldIdLst>
     <p:sldId id="256" r:id="rId2"/>
@@ -14,7 +14,11 @@
     <p:sldId id="259" r:id="rId5"/>
     <p:sldId id="260" r:id="rId6"/>
     <p:sldId id="262" r:id="rId7"/>
-    <p:sldId id="261" r:id="rId8"/>
+    <p:sldId id="263" r:id="rId8"/>
+    <p:sldId id="261" r:id="rId9"/>
+    <p:sldId id="264" r:id="rId10"/>
+    <p:sldId id="265" r:id="rId11"/>
+    <p:sldId id="266" r:id="rId12"/>
   </p:sldIdLst>
   <p:sldSz cx="12192000" cy="6858000"/>
   <p:notesSz cx="7315200" cy="9601200"/>
@@ -4540,7 +4544,7 @@
           <a:p>
             <a:fld id="{992D7E4C-1D33-4446-89FB-44852C272103}" type="datetimeFigureOut">
               <a:rPr lang="en-CA" smtClean="0"/>
-              <a:t>2023-05-25</a:t>
+              <a:t>2023-05-29</a:t>
             </a:fld>
             <a:endParaRPr lang="en-CA"/>
           </a:p>
@@ -4957,7 +4961,7 @@
           <a:p>
             <a:fld id="{A044A7A0-7B1D-4330-8526-9793827F1BBB}" type="datetimeFigureOut">
               <a:rPr lang="en-CA" smtClean="0"/>
-              <a:t>2023-05-25</a:t>
+              <a:t>2023-05-29</a:t>
             </a:fld>
             <a:endParaRPr lang="en-CA"/>
           </a:p>
@@ -5157,7 +5161,7 @@
           <a:p>
             <a:fld id="{A044A7A0-7B1D-4330-8526-9793827F1BBB}" type="datetimeFigureOut">
               <a:rPr lang="en-CA" smtClean="0"/>
-              <a:t>2023-05-25</a:t>
+              <a:t>2023-05-29</a:t>
             </a:fld>
             <a:endParaRPr lang="en-CA"/>
           </a:p>
@@ -5367,7 +5371,7 @@
           <a:p>
             <a:fld id="{A044A7A0-7B1D-4330-8526-9793827F1BBB}" type="datetimeFigureOut">
               <a:rPr lang="en-CA" smtClean="0"/>
-              <a:t>2023-05-25</a:t>
+              <a:t>2023-05-29</a:t>
             </a:fld>
             <a:endParaRPr lang="en-CA"/>
           </a:p>
@@ -5567,7 +5571,7 @@
           <a:p>
             <a:fld id="{A044A7A0-7B1D-4330-8526-9793827F1BBB}" type="datetimeFigureOut">
               <a:rPr lang="en-CA" smtClean="0"/>
-              <a:t>2023-05-25</a:t>
+              <a:t>2023-05-29</a:t>
             </a:fld>
             <a:endParaRPr lang="en-CA"/>
           </a:p>
@@ -5843,7 +5847,7 @@
           <a:p>
             <a:fld id="{A044A7A0-7B1D-4330-8526-9793827F1BBB}" type="datetimeFigureOut">
               <a:rPr lang="en-CA" smtClean="0"/>
-              <a:t>2023-05-25</a:t>
+              <a:t>2023-05-29</a:t>
             </a:fld>
             <a:endParaRPr lang="en-CA"/>
           </a:p>
@@ -6111,7 +6115,7 @@
           <a:p>
             <a:fld id="{A044A7A0-7B1D-4330-8526-9793827F1BBB}" type="datetimeFigureOut">
               <a:rPr lang="en-CA" smtClean="0"/>
-              <a:t>2023-05-25</a:t>
+              <a:t>2023-05-29</a:t>
             </a:fld>
             <a:endParaRPr lang="en-CA"/>
           </a:p>
@@ -6526,7 +6530,7 @@
           <a:p>
             <a:fld id="{A044A7A0-7B1D-4330-8526-9793827F1BBB}" type="datetimeFigureOut">
               <a:rPr lang="en-CA" smtClean="0"/>
-              <a:t>2023-05-25</a:t>
+              <a:t>2023-05-29</a:t>
             </a:fld>
             <a:endParaRPr lang="en-CA"/>
           </a:p>
@@ -6668,7 +6672,7 @@
           <a:p>
             <a:fld id="{A044A7A0-7B1D-4330-8526-9793827F1BBB}" type="datetimeFigureOut">
               <a:rPr lang="en-CA" smtClean="0"/>
-              <a:t>2023-05-25</a:t>
+              <a:t>2023-05-29</a:t>
             </a:fld>
             <a:endParaRPr lang="en-CA"/>
           </a:p>
@@ -6781,7 +6785,7 @@
           <a:p>
             <a:fld id="{A044A7A0-7B1D-4330-8526-9793827F1BBB}" type="datetimeFigureOut">
               <a:rPr lang="en-CA" smtClean="0"/>
-              <a:t>2023-05-25</a:t>
+              <a:t>2023-05-29</a:t>
             </a:fld>
             <a:endParaRPr lang="en-CA"/>
           </a:p>
@@ -7094,7 +7098,7 @@
           <a:p>
             <a:fld id="{A044A7A0-7B1D-4330-8526-9793827F1BBB}" type="datetimeFigureOut">
               <a:rPr lang="en-CA" smtClean="0"/>
-              <a:t>2023-05-25</a:t>
+              <a:t>2023-05-29</a:t>
             </a:fld>
             <a:endParaRPr lang="en-CA"/>
           </a:p>
@@ -7383,7 +7387,7 @@
           <a:p>
             <a:fld id="{A044A7A0-7B1D-4330-8526-9793827F1BBB}" type="datetimeFigureOut">
               <a:rPr lang="en-CA" smtClean="0"/>
-              <a:t>2023-05-25</a:t>
+              <a:t>2023-05-29</a:t>
             </a:fld>
             <a:endParaRPr lang="en-CA"/>
           </a:p>
@@ -7626,7 +7630,7 @@
           <a:p>
             <a:fld id="{A044A7A0-7B1D-4330-8526-9793827F1BBB}" type="datetimeFigureOut">
               <a:rPr lang="en-CA" smtClean="0"/>
-              <a:t>2023-05-25</a:t>
+              <a:t>2023-05-29</a:t>
             </a:fld>
             <a:endParaRPr lang="en-CA"/>
           </a:p>
@@ -8624,6 +8628,3019 @@
 </p:sld>
 </file>
 
+<file path=ppt/slides/slide10.xml><?xml version="1.0" encoding="utf-8"?>
+<p:sld xmlns:a="http://schemas.openxmlformats.org/drawingml/2006/main" xmlns:r="http://schemas.openxmlformats.org/officeDocument/2006/relationships" xmlns:p="http://schemas.openxmlformats.org/presentationml/2006/main">
+  <p:cSld>
+    <p:spTree>
+      <p:nvGrpSpPr>
+        <p:cNvPr id="1" name=""/>
+        <p:cNvGrpSpPr/>
+        <p:nvPr/>
+      </p:nvGrpSpPr>
+      <p:grpSpPr>
+        <a:xfrm>
+          <a:off x="0" y="0"/>
+          <a:ext cx="0" cy="0"/>
+          <a:chOff x="0" y="0"/>
+          <a:chExt cx="0" cy="0"/>
+        </a:xfrm>
+      </p:grpSpPr>
+      <p:sp>
+        <p:nvSpPr>
+          <p:cNvPr id="4" name="Rectangle 3">
+            <a:extLst>
+              <a:ext uri="{FF2B5EF4-FFF2-40B4-BE49-F238E27FC236}">
+                <a16:creationId xmlns:a16="http://schemas.microsoft.com/office/drawing/2014/main" id="{B795878D-4133-CFAC-832E-3F2359F2F836}"/>
+              </a:ext>
+            </a:extLst>
+          </p:cNvPr>
+          <p:cNvSpPr/>
+          <p:nvPr/>
+        </p:nvSpPr>
+        <p:spPr>
+          <a:xfrm>
+            <a:off x="1186903" y="823566"/>
+            <a:ext cx="6576414" cy="5413732"/>
+          </a:xfrm>
+          <a:prstGeom prst="rect">
+            <a:avLst/>
+          </a:prstGeom>
+          <a:noFill/>
+          <a:ln>
+            <a:solidFill>
+              <a:srgbClr val="3B3838"/>
+            </a:solidFill>
+          </a:ln>
+        </p:spPr>
+        <p:style>
+          <a:lnRef idx="2">
+            <a:schemeClr val="accent1">
+              <a:shade val="50000"/>
+            </a:schemeClr>
+          </a:lnRef>
+          <a:fillRef idx="1">
+            <a:schemeClr val="accent1"/>
+          </a:fillRef>
+          <a:effectRef idx="0">
+            <a:schemeClr val="accent1"/>
+          </a:effectRef>
+          <a:fontRef idx="minor">
+            <a:schemeClr val="lt1"/>
+          </a:fontRef>
+        </p:style>
+        <p:txBody>
+          <a:bodyPr rtlCol="0" anchor="ctr"/>
+          <a:lstStyle/>
+          <a:p>
+            <a:pPr algn="ctr"/>
+            <a:endParaRPr lang="en-CA"/>
+          </a:p>
+        </p:txBody>
+      </p:sp>
+      <p:sp>
+        <p:nvSpPr>
+          <p:cNvPr id="5" name="Rectangle 4">
+            <a:extLst>
+              <a:ext uri="{FF2B5EF4-FFF2-40B4-BE49-F238E27FC236}">
+                <a16:creationId xmlns:a16="http://schemas.microsoft.com/office/drawing/2014/main" id="{75A1C56A-A625-E469-A2E0-7CEE76EB6F87}"/>
+              </a:ext>
+            </a:extLst>
+          </p:cNvPr>
+          <p:cNvSpPr/>
+          <p:nvPr/>
+        </p:nvSpPr>
+        <p:spPr>
+          <a:xfrm>
+            <a:off x="1259571" y="896233"/>
+            <a:ext cx="6418967" cy="1314072"/>
+          </a:xfrm>
+          <a:prstGeom prst="rect">
+            <a:avLst/>
+          </a:prstGeom>
+          <a:noFill/>
+          <a:ln>
+            <a:solidFill>
+              <a:srgbClr val="CE9178"/>
+            </a:solidFill>
+          </a:ln>
+        </p:spPr>
+        <p:style>
+          <a:lnRef idx="2">
+            <a:schemeClr val="accent1">
+              <a:shade val="50000"/>
+            </a:schemeClr>
+          </a:lnRef>
+          <a:fillRef idx="1">
+            <a:schemeClr val="accent1"/>
+          </a:fillRef>
+          <a:effectRef idx="0">
+            <a:schemeClr val="accent1"/>
+          </a:effectRef>
+          <a:fontRef idx="minor">
+            <a:schemeClr val="lt1"/>
+          </a:fontRef>
+        </p:style>
+        <p:txBody>
+          <a:bodyPr rtlCol="0" anchor="ctr"/>
+          <a:lstStyle/>
+          <a:p>
+            <a:pPr algn="ctr"/>
+            <a:endParaRPr lang="en-CA"/>
+          </a:p>
+        </p:txBody>
+      </p:sp>
+      <p:cxnSp>
+        <p:nvCxnSpPr>
+          <p:cNvPr id="8" name="Straight Connector 7">
+            <a:extLst>
+              <a:ext uri="{FF2B5EF4-FFF2-40B4-BE49-F238E27FC236}">
+                <a16:creationId xmlns:a16="http://schemas.microsoft.com/office/drawing/2014/main" id="{34B0335A-7E65-4D8E-05FC-8A4EB2805A26}"/>
+              </a:ext>
+            </a:extLst>
+          </p:cNvPr>
+          <p:cNvCxnSpPr/>
+          <p:nvPr/>
+        </p:nvCxnSpPr>
+        <p:spPr>
+          <a:xfrm>
+            <a:off x="7145642" y="1968079"/>
+            <a:ext cx="387561" cy="0"/>
+          </a:xfrm>
+          <a:prstGeom prst="line">
+            <a:avLst/>
+          </a:prstGeom>
+        </p:spPr>
+        <p:style>
+          <a:lnRef idx="1">
+            <a:schemeClr val="accent1"/>
+          </a:lnRef>
+          <a:fillRef idx="0">
+            <a:schemeClr val="accent1"/>
+          </a:fillRef>
+          <a:effectRef idx="0">
+            <a:schemeClr val="accent1"/>
+          </a:effectRef>
+          <a:fontRef idx="minor">
+            <a:schemeClr val="tx1"/>
+          </a:fontRef>
+        </p:style>
+      </p:cxnSp>
+      <p:cxnSp>
+        <p:nvCxnSpPr>
+          <p:cNvPr id="9" name="Straight Connector 8">
+            <a:extLst>
+              <a:ext uri="{FF2B5EF4-FFF2-40B4-BE49-F238E27FC236}">
+                <a16:creationId xmlns:a16="http://schemas.microsoft.com/office/drawing/2014/main" id="{A55971C4-0F6D-3DD5-F248-FBC8A28B560D}"/>
+              </a:ext>
+            </a:extLst>
+          </p:cNvPr>
+          <p:cNvCxnSpPr/>
+          <p:nvPr/>
+        </p:nvCxnSpPr>
+        <p:spPr>
+          <a:xfrm>
+            <a:off x="7145642" y="2120479"/>
+            <a:ext cx="387561" cy="0"/>
+          </a:xfrm>
+          <a:prstGeom prst="line">
+            <a:avLst/>
+          </a:prstGeom>
+        </p:spPr>
+        <p:style>
+          <a:lnRef idx="1">
+            <a:schemeClr val="accent1"/>
+          </a:lnRef>
+          <a:fillRef idx="0">
+            <a:schemeClr val="accent1"/>
+          </a:fillRef>
+          <a:effectRef idx="0">
+            <a:schemeClr val="accent1"/>
+          </a:effectRef>
+          <a:fontRef idx="minor">
+            <a:schemeClr val="tx1"/>
+          </a:fontRef>
+        </p:style>
+      </p:cxnSp>
+      <p:cxnSp>
+        <p:nvCxnSpPr>
+          <p:cNvPr id="10" name="Straight Connector 9">
+            <a:extLst>
+              <a:ext uri="{FF2B5EF4-FFF2-40B4-BE49-F238E27FC236}">
+                <a16:creationId xmlns:a16="http://schemas.microsoft.com/office/drawing/2014/main" id="{A1815CA1-36F9-315C-8173-8E00AD441B48}"/>
+              </a:ext>
+            </a:extLst>
+          </p:cNvPr>
+          <p:cNvCxnSpPr/>
+          <p:nvPr/>
+        </p:nvCxnSpPr>
+        <p:spPr>
+          <a:xfrm>
+            <a:off x="7145642" y="2024598"/>
+            <a:ext cx="387561" cy="0"/>
+          </a:xfrm>
+          <a:prstGeom prst="line">
+            <a:avLst/>
+          </a:prstGeom>
+        </p:spPr>
+        <p:style>
+          <a:lnRef idx="1">
+            <a:schemeClr val="accent1"/>
+          </a:lnRef>
+          <a:fillRef idx="0">
+            <a:schemeClr val="accent1"/>
+          </a:fillRef>
+          <a:effectRef idx="0">
+            <a:schemeClr val="accent1"/>
+          </a:effectRef>
+          <a:fontRef idx="minor">
+            <a:schemeClr val="tx1"/>
+          </a:fontRef>
+        </p:style>
+      </p:cxnSp>
+      <p:cxnSp>
+        <p:nvCxnSpPr>
+          <p:cNvPr id="11" name="Straight Connector 10">
+            <a:extLst>
+              <a:ext uri="{FF2B5EF4-FFF2-40B4-BE49-F238E27FC236}">
+                <a16:creationId xmlns:a16="http://schemas.microsoft.com/office/drawing/2014/main" id="{D24A2F27-F7BE-EDD0-B5D2-BB93D40D6ED5}"/>
+              </a:ext>
+            </a:extLst>
+          </p:cNvPr>
+          <p:cNvCxnSpPr/>
+          <p:nvPr/>
+        </p:nvCxnSpPr>
+        <p:spPr>
+          <a:xfrm>
+            <a:off x="7145642" y="2071021"/>
+            <a:ext cx="387561" cy="0"/>
+          </a:xfrm>
+          <a:prstGeom prst="line">
+            <a:avLst/>
+          </a:prstGeom>
+        </p:spPr>
+        <p:style>
+          <a:lnRef idx="1">
+            <a:schemeClr val="accent1"/>
+          </a:lnRef>
+          <a:fillRef idx="0">
+            <a:schemeClr val="accent1"/>
+          </a:fillRef>
+          <a:effectRef idx="0">
+            <a:schemeClr val="accent1"/>
+          </a:effectRef>
+          <a:fontRef idx="minor">
+            <a:schemeClr val="tx1"/>
+          </a:fontRef>
+        </p:style>
+      </p:cxnSp>
+      <p:sp>
+        <p:nvSpPr>
+          <p:cNvPr id="14" name="Rectangle 13">
+            <a:extLst>
+              <a:ext uri="{FF2B5EF4-FFF2-40B4-BE49-F238E27FC236}">
+                <a16:creationId xmlns:a16="http://schemas.microsoft.com/office/drawing/2014/main" id="{45488D2F-DF9C-0A51-91A4-9F2E3823728F}"/>
+              </a:ext>
+            </a:extLst>
+          </p:cNvPr>
+          <p:cNvSpPr/>
+          <p:nvPr/>
+        </p:nvSpPr>
+        <p:spPr>
+          <a:xfrm>
+            <a:off x="3512264" y="2416192"/>
+            <a:ext cx="4166273" cy="3015703"/>
+          </a:xfrm>
+          <a:prstGeom prst="rect">
+            <a:avLst/>
+          </a:prstGeom>
+          <a:noFill/>
+        </p:spPr>
+        <p:style>
+          <a:lnRef idx="2">
+            <a:schemeClr val="accent1">
+              <a:shade val="50000"/>
+            </a:schemeClr>
+          </a:lnRef>
+          <a:fillRef idx="1">
+            <a:schemeClr val="accent1"/>
+          </a:fillRef>
+          <a:effectRef idx="0">
+            <a:schemeClr val="accent1"/>
+          </a:effectRef>
+          <a:fontRef idx="minor">
+            <a:schemeClr val="lt1"/>
+          </a:fontRef>
+        </p:style>
+        <p:txBody>
+          <a:bodyPr rtlCol="0" anchor="ctr"/>
+          <a:lstStyle/>
+          <a:p>
+            <a:pPr algn="ctr"/>
+            <a:endParaRPr lang="en-CA"/>
+          </a:p>
+        </p:txBody>
+      </p:sp>
+      <p:sp>
+        <p:nvSpPr>
+          <p:cNvPr id="15" name="TextBox 14">
+            <a:extLst>
+              <a:ext uri="{FF2B5EF4-FFF2-40B4-BE49-F238E27FC236}">
+                <a16:creationId xmlns:a16="http://schemas.microsoft.com/office/drawing/2014/main" id="{29A2FCD0-29D2-9C67-D8E7-69C9C184ABDF}"/>
+              </a:ext>
+            </a:extLst>
+          </p:cNvPr>
+          <p:cNvSpPr txBox="1"/>
+          <p:nvPr/>
+        </p:nvSpPr>
+        <p:spPr>
+          <a:xfrm>
+            <a:off x="2105584" y="1288610"/>
+            <a:ext cx="2798267" cy="369332"/>
+          </a:xfrm>
+          <a:prstGeom prst="rect">
+            <a:avLst/>
+          </a:prstGeom>
+          <a:noFill/>
+        </p:spPr>
+        <p:txBody>
+          <a:bodyPr wrap="none" rtlCol="0">
+            <a:spAutoFit/>
+          </a:bodyPr>
+          <a:lstStyle/>
+          <a:p>
+            <a:r>
+              <a:rPr lang="en-CA" dirty="0"/>
+              <a:t>Add new appointment page</a:t>
+            </a:r>
+          </a:p>
+        </p:txBody>
+      </p:sp>
+      <p:grpSp>
+        <p:nvGrpSpPr>
+          <p:cNvPr id="3" name="Group 2">
+            <a:extLst>
+              <a:ext uri="{FF2B5EF4-FFF2-40B4-BE49-F238E27FC236}">
+                <a16:creationId xmlns:a16="http://schemas.microsoft.com/office/drawing/2014/main" id="{6BDFC24D-C15D-5116-8278-3310EA0E4B8C}"/>
+              </a:ext>
+            </a:extLst>
+          </p:cNvPr>
+          <p:cNvGrpSpPr/>
+          <p:nvPr/>
+        </p:nvGrpSpPr>
+        <p:grpSpPr>
+          <a:xfrm>
+            <a:off x="6225020" y="4795200"/>
+            <a:ext cx="1374627" cy="484451"/>
+            <a:chOff x="6008194" y="4774859"/>
+            <a:chExt cx="1374627" cy="484451"/>
+          </a:xfrm>
+        </p:grpSpPr>
+        <p:sp>
+          <p:nvSpPr>
+            <p:cNvPr id="16" name="Rectangle: Rounded Corners 15">
+              <a:extLst>
+                <a:ext uri="{FF2B5EF4-FFF2-40B4-BE49-F238E27FC236}">
+                  <a16:creationId xmlns:a16="http://schemas.microsoft.com/office/drawing/2014/main" id="{B4FFC496-018F-2087-117B-D26F9558CEF2}"/>
+                </a:ext>
+              </a:extLst>
+            </p:cNvPr>
+            <p:cNvSpPr/>
+            <p:nvPr/>
+          </p:nvSpPr>
+          <p:spPr>
+            <a:xfrm>
+              <a:off x="6008194" y="4774859"/>
+              <a:ext cx="1374627" cy="484451"/>
+            </a:xfrm>
+            <a:prstGeom prst="roundRect">
+              <a:avLst/>
+            </a:prstGeom>
+            <a:noFill/>
+          </p:spPr>
+          <p:style>
+            <a:lnRef idx="2">
+              <a:schemeClr val="accent1">
+                <a:shade val="50000"/>
+              </a:schemeClr>
+            </a:lnRef>
+            <a:fillRef idx="1">
+              <a:schemeClr val="accent1"/>
+            </a:fillRef>
+            <a:effectRef idx="0">
+              <a:schemeClr val="accent1"/>
+            </a:effectRef>
+            <a:fontRef idx="minor">
+              <a:schemeClr val="lt1"/>
+            </a:fontRef>
+          </p:style>
+          <p:txBody>
+            <a:bodyPr rtlCol="0" anchor="ctr"/>
+            <a:lstStyle/>
+            <a:p>
+              <a:pPr algn="ctr"/>
+              <a:endParaRPr lang="en-CA"/>
+            </a:p>
+          </p:txBody>
+        </p:sp>
+        <p:sp>
+          <p:nvSpPr>
+            <p:cNvPr id="17" name="TextBox 16">
+              <a:extLst>
+                <a:ext uri="{FF2B5EF4-FFF2-40B4-BE49-F238E27FC236}">
+                  <a16:creationId xmlns:a16="http://schemas.microsoft.com/office/drawing/2014/main" id="{116E42F5-A7D7-0E72-E38B-36C40EE3B91E}"/>
+                </a:ext>
+              </a:extLst>
+            </p:cNvPr>
+            <p:cNvSpPr txBox="1"/>
+            <p:nvPr/>
+          </p:nvSpPr>
+          <p:spPr>
+            <a:xfrm>
+              <a:off x="6445983" y="4890491"/>
+              <a:ext cx="499047" cy="276999"/>
+            </a:xfrm>
+            <a:prstGeom prst="rect">
+              <a:avLst/>
+            </a:prstGeom>
+            <a:noFill/>
+          </p:spPr>
+          <p:txBody>
+            <a:bodyPr wrap="none" rtlCol="0">
+              <a:spAutoFit/>
+            </a:bodyPr>
+            <a:lstStyle/>
+            <a:p>
+              <a:pPr algn="ctr"/>
+              <a:r>
+                <a:rPr lang="en-CA" sz="1200" dirty="0"/>
+                <a:t>SAVE</a:t>
+              </a:r>
+            </a:p>
+          </p:txBody>
+        </p:sp>
+      </p:grpSp>
+      <p:sp>
+        <p:nvSpPr>
+          <p:cNvPr id="18" name="Rectangle 17">
+            <a:extLst>
+              <a:ext uri="{FF2B5EF4-FFF2-40B4-BE49-F238E27FC236}">
+                <a16:creationId xmlns:a16="http://schemas.microsoft.com/office/drawing/2014/main" id="{7CAB7197-E4C5-161A-BCFC-6368648AF9BA}"/>
+              </a:ext>
+            </a:extLst>
+          </p:cNvPr>
+          <p:cNvSpPr/>
+          <p:nvPr/>
+        </p:nvSpPr>
+        <p:spPr>
+          <a:xfrm>
+            <a:off x="1259571" y="5574207"/>
+            <a:ext cx="6418967" cy="638746"/>
+          </a:xfrm>
+          <a:prstGeom prst="rect">
+            <a:avLst/>
+          </a:prstGeom>
+          <a:noFill/>
+          <a:ln>
+            <a:solidFill>
+              <a:srgbClr val="CE9178"/>
+            </a:solidFill>
+          </a:ln>
+        </p:spPr>
+        <p:style>
+          <a:lnRef idx="2">
+            <a:schemeClr val="accent1">
+              <a:shade val="50000"/>
+            </a:schemeClr>
+          </a:lnRef>
+          <a:fillRef idx="1">
+            <a:schemeClr val="accent1"/>
+          </a:fillRef>
+          <a:effectRef idx="0">
+            <a:schemeClr val="accent1"/>
+          </a:effectRef>
+          <a:fontRef idx="minor">
+            <a:schemeClr val="lt1"/>
+          </a:fontRef>
+        </p:style>
+        <p:txBody>
+          <a:bodyPr rtlCol="0" anchor="ctr"/>
+          <a:lstStyle/>
+          <a:p>
+            <a:pPr algn="ctr"/>
+            <a:endParaRPr lang="en-CA"/>
+          </a:p>
+        </p:txBody>
+      </p:sp>
+      <p:sp>
+        <p:nvSpPr>
+          <p:cNvPr id="19" name="TextBox 18">
+            <a:extLst>
+              <a:ext uri="{FF2B5EF4-FFF2-40B4-BE49-F238E27FC236}">
+                <a16:creationId xmlns:a16="http://schemas.microsoft.com/office/drawing/2014/main" id="{9DE6D796-9483-ADC1-9CDA-12CFB0B2F40E}"/>
+              </a:ext>
+            </a:extLst>
+          </p:cNvPr>
+          <p:cNvSpPr txBox="1"/>
+          <p:nvPr/>
+        </p:nvSpPr>
+        <p:spPr>
+          <a:xfrm>
+            <a:off x="1702373" y="5634825"/>
+            <a:ext cx="763992" cy="369332"/>
+          </a:xfrm>
+          <a:prstGeom prst="rect">
+            <a:avLst/>
+          </a:prstGeom>
+          <a:noFill/>
+        </p:spPr>
+        <p:txBody>
+          <a:bodyPr wrap="none" rtlCol="0">
+            <a:spAutoFit/>
+          </a:bodyPr>
+          <a:lstStyle/>
+          <a:p>
+            <a:r>
+              <a:rPr lang="en-CA" dirty="0"/>
+              <a:t>footer</a:t>
+            </a:r>
+          </a:p>
+        </p:txBody>
+      </p:sp>
+      <p:sp>
+        <p:nvSpPr>
+          <p:cNvPr id="7" name="Rectangle 6">
+            <a:extLst>
+              <a:ext uri="{FF2B5EF4-FFF2-40B4-BE49-F238E27FC236}">
+                <a16:creationId xmlns:a16="http://schemas.microsoft.com/office/drawing/2014/main" id="{8B5A46A8-367F-3516-BCF8-57E5B30D7991}"/>
+              </a:ext>
+            </a:extLst>
+          </p:cNvPr>
+          <p:cNvSpPr/>
+          <p:nvPr/>
+        </p:nvSpPr>
+        <p:spPr>
+          <a:xfrm>
+            <a:off x="1259571" y="2403958"/>
+            <a:ext cx="2167913" cy="3015703"/>
+          </a:xfrm>
+          <a:prstGeom prst="rect">
+            <a:avLst/>
+          </a:prstGeom>
+          <a:noFill/>
+        </p:spPr>
+        <p:style>
+          <a:lnRef idx="2">
+            <a:schemeClr val="accent1">
+              <a:shade val="50000"/>
+            </a:schemeClr>
+          </a:lnRef>
+          <a:fillRef idx="1">
+            <a:schemeClr val="accent1"/>
+          </a:fillRef>
+          <a:effectRef idx="0">
+            <a:schemeClr val="accent1"/>
+          </a:effectRef>
+          <a:fontRef idx="minor">
+            <a:schemeClr val="lt1"/>
+          </a:fontRef>
+        </p:style>
+        <p:txBody>
+          <a:bodyPr rtlCol="0" anchor="ctr"/>
+          <a:lstStyle/>
+          <a:p>
+            <a:pPr algn="ctr"/>
+            <a:endParaRPr lang="en-CA"/>
+          </a:p>
+        </p:txBody>
+      </p:sp>
+      <p:sp>
+        <p:nvSpPr>
+          <p:cNvPr id="20" name="TextBox 19">
+            <a:extLst>
+              <a:ext uri="{FF2B5EF4-FFF2-40B4-BE49-F238E27FC236}">
+                <a16:creationId xmlns:a16="http://schemas.microsoft.com/office/drawing/2014/main" id="{EEA9051A-857B-AF7C-CF7C-11D1D4F2F3BC}"/>
+              </a:ext>
+            </a:extLst>
+          </p:cNvPr>
+          <p:cNvSpPr txBox="1"/>
+          <p:nvPr/>
+        </p:nvSpPr>
+        <p:spPr>
+          <a:xfrm>
+            <a:off x="1413334" y="2931366"/>
+            <a:ext cx="1872500" cy="338554"/>
+          </a:xfrm>
+          <a:prstGeom prst="rect">
+            <a:avLst/>
+          </a:prstGeom>
+          <a:noFill/>
+        </p:spPr>
+        <p:txBody>
+          <a:bodyPr wrap="none" rtlCol="0">
+            <a:spAutoFit/>
+          </a:bodyPr>
+          <a:lstStyle/>
+          <a:p>
+            <a:r>
+              <a:rPr lang="en-CA" sz="1600" dirty="0"/>
+              <a:t>User input/interface</a:t>
+            </a:r>
+          </a:p>
+        </p:txBody>
+      </p:sp>
+      <p:grpSp>
+        <p:nvGrpSpPr>
+          <p:cNvPr id="25" name="Group 24">
+            <a:extLst>
+              <a:ext uri="{FF2B5EF4-FFF2-40B4-BE49-F238E27FC236}">
+                <a16:creationId xmlns:a16="http://schemas.microsoft.com/office/drawing/2014/main" id="{0B1C2961-EC2D-F2EC-28B5-66A68C691DF8}"/>
+              </a:ext>
+            </a:extLst>
+          </p:cNvPr>
+          <p:cNvGrpSpPr/>
+          <p:nvPr/>
+        </p:nvGrpSpPr>
+        <p:grpSpPr>
+          <a:xfrm>
+            <a:off x="3760546" y="2607504"/>
+            <a:ext cx="3772657" cy="369332"/>
+            <a:chOff x="3760546" y="2607504"/>
+            <a:chExt cx="3772657" cy="369332"/>
+          </a:xfrm>
+          <a:noFill/>
+        </p:grpSpPr>
+        <p:sp>
+          <p:nvSpPr>
+            <p:cNvPr id="21" name="Rectangle 20">
+              <a:extLst>
+                <a:ext uri="{FF2B5EF4-FFF2-40B4-BE49-F238E27FC236}">
+                  <a16:creationId xmlns:a16="http://schemas.microsoft.com/office/drawing/2014/main" id="{91E4C56D-6E6D-3AD5-F7E8-5EE52CB277CD}"/>
+                </a:ext>
+              </a:extLst>
+            </p:cNvPr>
+            <p:cNvSpPr/>
+            <p:nvPr/>
+          </p:nvSpPr>
+          <p:spPr>
+            <a:xfrm>
+              <a:off x="3760546" y="2607504"/>
+              <a:ext cx="3772657" cy="369332"/>
+            </a:xfrm>
+            <a:prstGeom prst="rect">
+              <a:avLst/>
+            </a:prstGeom>
+            <a:grpFill/>
+            <a:ln>
+              <a:solidFill>
+                <a:srgbClr val="92D050"/>
+              </a:solidFill>
+            </a:ln>
+          </p:spPr>
+          <p:style>
+            <a:lnRef idx="2">
+              <a:schemeClr val="accent1">
+                <a:shade val="50000"/>
+              </a:schemeClr>
+            </a:lnRef>
+            <a:fillRef idx="1">
+              <a:schemeClr val="accent1"/>
+            </a:fillRef>
+            <a:effectRef idx="0">
+              <a:schemeClr val="accent1"/>
+            </a:effectRef>
+            <a:fontRef idx="minor">
+              <a:schemeClr val="lt1"/>
+            </a:fontRef>
+          </p:style>
+          <p:txBody>
+            <a:bodyPr rtlCol="0" anchor="ctr"/>
+            <a:lstStyle/>
+            <a:p>
+              <a:pPr algn="ctr"/>
+              <a:endParaRPr lang="en-CA" dirty="0">
+                <a:ln>
+                  <a:solidFill>
+                    <a:srgbClr val="3B3838"/>
+                  </a:solidFill>
+                </a:ln>
+              </a:endParaRPr>
+            </a:p>
+          </p:txBody>
+        </p:sp>
+        <p:sp>
+          <p:nvSpPr>
+            <p:cNvPr id="23" name="TextBox 22">
+              <a:extLst>
+                <a:ext uri="{FF2B5EF4-FFF2-40B4-BE49-F238E27FC236}">
+                  <a16:creationId xmlns:a16="http://schemas.microsoft.com/office/drawing/2014/main" id="{25D2E69C-36DF-6F91-B03A-B33C565E9EC2}"/>
+                </a:ext>
+              </a:extLst>
+            </p:cNvPr>
+            <p:cNvSpPr txBox="1"/>
+            <p:nvPr/>
+          </p:nvSpPr>
+          <p:spPr>
+            <a:xfrm>
+              <a:off x="3794508" y="2634095"/>
+              <a:ext cx="1455848" cy="276999"/>
+            </a:xfrm>
+            <a:prstGeom prst="rect">
+              <a:avLst/>
+            </a:prstGeom>
+            <a:grpFill/>
+            <a:ln>
+              <a:solidFill>
+                <a:srgbClr val="92D050"/>
+              </a:solidFill>
+            </a:ln>
+          </p:spPr>
+          <p:txBody>
+            <a:bodyPr wrap="none" rtlCol="0">
+              <a:spAutoFit/>
+            </a:bodyPr>
+            <a:lstStyle/>
+            <a:p>
+              <a:r>
+                <a:rPr lang="en-CA" sz="1200" dirty="0"/>
+                <a:t>Customer Full Name</a:t>
+              </a:r>
+            </a:p>
+          </p:txBody>
+        </p:sp>
+      </p:grpSp>
+      <p:sp>
+        <p:nvSpPr>
+          <p:cNvPr id="24" name="TextBox 23">
+            <a:extLst>
+              <a:ext uri="{FF2B5EF4-FFF2-40B4-BE49-F238E27FC236}">
+                <a16:creationId xmlns:a16="http://schemas.microsoft.com/office/drawing/2014/main" id="{A4049189-F769-234D-7D4E-A82F7897B89E}"/>
+              </a:ext>
+            </a:extLst>
+          </p:cNvPr>
+          <p:cNvSpPr txBox="1"/>
+          <p:nvPr/>
+        </p:nvSpPr>
+        <p:spPr>
+          <a:xfrm>
+            <a:off x="3960381" y="3468287"/>
+            <a:ext cx="3276096" cy="307777"/>
+          </a:xfrm>
+          <a:prstGeom prst="rect">
+            <a:avLst/>
+          </a:prstGeom>
+          <a:noFill/>
+        </p:spPr>
+        <p:txBody>
+          <a:bodyPr wrap="square" rtlCol="0">
+            <a:spAutoFit/>
+          </a:bodyPr>
+          <a:lstStyle/>
+          <a:p>
+            <a:pPr>
+              <a:tabLst>
+                <a:tab pos="714375" algn="l"/>
+              </a:tabLst>
+            </a:pPr>
+            <a:r>
+              <a:rPr lang="en-CA" sz="1400" dirty="0"/>
+              <a:t>Date			time-slot</a:t>
+            </a:r>
+          </a:p>
+        </p:txBody>
+      </p:sp>
+      <p:sp>
+        <p:nvSpPr>
+          <p:cNvPr id="27" name="Rectangle 26">
+            <a:extLst>
+              <a:ext uri="{FF2B5EF4-FFF2-40B4-BE49-F238E27FC236}">
+                <a16:creationId xmlns:a16="http://schemas.microsoft.com/office/drawing/2014/main" id="{2BAA3D76-589A-FD92-729E-225931E7DD94}"/>
+              </a:ext>
+            </a:extLst>
+          </p:cNvPr>
+          <p:cNvSpPr/>
+          <p:nvPr/>
+        </p:nvSpPr>
+        <p:spPr>
+          <a:xfrm>
+            <a:off x="3754633" y="3414037"/>
+            <a:ext cx="3772657" cy="369332"/>
+          </a:xfrm>
+          <a:prstGeom prst="rect">
+            <a:avLst/>
+          </a:prstGeom>
+          <a:noFill/>
+          <a:ln>
+            <a:solidFill>
+              <a:srgbClr val="92D050"/>
+            </a:solidFill>
+          </a:ln>
+        </p:spPr>
+        <p:style>
+          <a:lnRef idx="2">
+            <a:schemeClr val="accent1">
+              <a:shade val="50000"/>
+            </a:schemeClr>
+          </a:lnRef>
+          <a:fillRef idx="1">
+            <a:schemeClr val="accent1"/>
+          </a:fillRef>
+          <a:effectRef idx="0">
+            <a:schemeClr val="accent1"/>
+          </a:effectRef>
+          <a:fontRef idx="minor">
+            <a:schemeClr val="lt1"/>
+          </a:fontRef>
+        </p:style>
+        <p:txBody>
+          <a:bodyPr rtlCol="0" anchor="ctr"/>
+          <a:lstStyle/>
+          <a:p>
+            <a:pPr algn="ctr"/>
+            <a:endParaRPr lang="en-CA" dirty="0">
+              <a:ln>
+                <a:solidFill>
+                  <a:srgbClr val="3B3838"/>
+                </a:solidFill>
+              </a:ln>
+            </a:endParaRPr>
+          </a:p>
+        </p:txBody>
+      </p:sp>
+      <p:sp>
+        <p:nvSpPr>
+          <p:cNvPr id="28" name="TextBox 27">
+            <a:extLst>
+              <a:ext uri="{FF2B5EF4-FFF2-40B4-BE49-F238E27FC236}">
+                <a16:creationId xmlns:a16="http://schemas.microsoft.com/office/drawing/2014/main" id="{901BCDA2-D74A-32DD-F5F5-632545E8E42A}"/>
+              </a:ext>
+            </a:extLst>
+          </p:cNvPr>
+          <p:cNvSpPr txBox="1"/>
+          <p:nvPr/>
+        </p:nvSpPr>
+        <p:spPr>
+          <a:xfrm>
+            <a:off x="3794508" y="3051001"/>
+            <a:ext cx="1369606" cy="276999"/>
+          </a:xfrm>
+          <a:prstGeom prst="rect">
+            <a:avLst/>
+          </a:prstGeom>
+          <a:noFill/>
+          <a:ln>
+            <a:solidFill>
+              <a:srgbClr val="92D050"/>
+            </a:solidFill>
+          </a:ln>
+        </p:spPr>
+        <p:txBody>
+          <a:bodyPr wrap="square" rtlCol="0">
+            <a:spAutoFit/>
+          </a:bodyPr>
+          <a:lstStyle/>
+          <a:p>
+            <a:r>
+              <a:rPr lang="en-CA" sz="1200" dirty="0"/>
+              <a:t>email</a:t>
+            </a:r>
+          </a:p>
+        </p:txBody>
+      </p:sp>
+      <p:grpSp>
+        <p:nvGrpSpPr>
+          <p:cNvPr id="29" name="Group 28">
+            <a:extLst>
+              <a:ext uri="{FF2B5EF4-FFF2-40B4-BE49-F238E27FC236}">
+                <a16:creationId xmlns:a16="http://schemas.microsoft.com/office/drawing/2014/main" id="{C2053FF4-2041-857B-C6A2-C9EC31F13C27}"/>
+              </a:ext>
+            </a:extLst>
+          </p:cNvPr>
+          <p:cNvGrpSpPr/>
+          <p:nvPr/>
+        </p:nvGrpSpPr>
+        <p:grpSpPr>
+          <a:xfrm>
+            <a:off x="3753847" y="3881959"/>
+            <a:ext cx="3772657" cy="369332"/>
+            <a:chOff x="3760546" y="2607504"/>
+            <a:chExt cx="3772657" cy="369332"/>
+          </a:xfrm>
+          <a:noFill/>
+        </p:grpSpPr>
+        <p:sp>
+          <p:nvSpPr>
+            <p:cNvPr id="30" name="Rectangle 29">
+              <a:extLst>
+                <a:ext uri="{FF2B5EF4-FFF2-40B4-BE49-F238E27FC236}">
+                  <a16:creationId xmlns:a16="http://schemas.microsoft.com/office/drawing/2014/main" id="{43B5267C-972C-6C0C-AB0F-6607C5B5C1DD}"/>
+                </a:ext>
+              </a:extLst>
+            </p:cNvPr>
+            <p:cNvSpPr/>
+            <p:nvPr/>
+          </p:nvSpPr>
+          <p:spPr>
+            <a:xfrm>
+              <a:off x="3760546" y="2607504"/>
+              <a:ext cx="3772657" cy="369332"/>
+            </a:xfrm>
+            <a:prstGeom prst="rect">
+              <a:avLst/>
+            </a:prstGeom>
+            <a:grpFill/>
+            <a:ln>
+              <a:solidFill>
+                <a:srgbClr val="92D050"/>
+              </a:solidFill>
+            </a:ln>
+          </p:spPr>
+          <p:style>
+            <a:lnRef idx="2">
+              <a:schemeClr val="accent1">
+                <a:shade val="50000"/>
+              </a:schemeClr>
+            </a:lnRef>
+            <a:fillRef idx="1">
+              <a:schemeClr val="accent1"/>
+            </a:fillRef>
+            <a:effectRef idx="0">
+              <a:schemeClr val="accent1"/>
+            </a:effectRef>
+            <a:fontRef idx="minor">
+              <a:schemeClr val="lt1"/>
+            </a:fontRef>
+          </p:style>
+          <p:txBody>
+            <a:bodyPr rtlCol="0" anchor="ctr"/>
+            <a:lstStyle/>
+            <a:p>
+              <a:pPr algn="ctr"/>
+              <a:endParaRPr lang="en-CA" dirty="0">
+                <a:ln>
+                  <a:solidFill>
+                    <a:srgbClr val="3B3838"/>
+                  </a:solidFill>
+                </a:ln>
+              </a:endParaRPr>
+            </a:p>
+          </p:txBody>
+        </p:sp>
+        <p:sp>
+          <p:nvSpPr>
+            <p:cNvPr id="31" name="TextBox 30">
+              <a:extLst>
+                <a:ext uri="{FF2B5EF4-FFF2-40B4-BE49-F238E27FC236}">
+                  <a16:creationId xmlns:a16="http://schemas.microsoft.com/office/drawing/2014/main" id="{57F1140A-7875-BD65-9119-D0C32BC8298C}"/>
+                </a:ext>
+              </a:extLst>
+            </p:cNvPr>
+            <p:cNvSpPr txBox="1"/>
+            <p:nvPr/>
+          </p:nvSpPr>
+          <p:spPr>
+            <a:xfrm>
+              <a:off x="3794508" y="2634095"/>
+              <a:ext cx="668324" cy="276999"/>
+            </a:xfrm>
+            <a:prstGeom prst="rect">
+              <a:avLst/>
+            </a:prstGeom>
+            <a:grpFill/>
+            <a:ln>
+              <a:solidFill>
+                <a:srgbClr val="92D050"/>
+              </a:solidFill>
+            </a:ln>
+          </p:spPr>
+          <p:txBody>
+            <a:bodyPr wrap="none" rtlCol="0">
+              <a:spAutoFit/>
+            </a:bodyPr>
+            <a:lstStyle/>
+            <a:p>
+              <a:r>
+                <a:rPr lang="en-CA" sz="1200" dirty="0"/>
+                <a:t>address</a:t>
+              </a:r>
+            </a:p>
+          </p:txBody>
+        </p:sp>
+      </p:grpSp>
+      <p:grpSp>
+        <p:nvGrpSpPr>
+          <p:cNvPr id="32" name="Group 31">
+            <a:extLst>
+              <a:ext uri="{FF2B5EF4-FFF2-40B4-BE49-F238E27FC236}">
+                <a16:creationId xmlns:a16="http://schemas.microsoft.com/office/drawing/2014/main" id="{2FFE579D-446C-6DC1-FC5D-B15E68455A05}"/>
+              </a:ext>
+            </a:extLst>
+          </p:cNvPr>
+          <p:cNvGrpSpPr/>
+          <p:nvPr/>
+        </p:nvGrpSpPr>
+        <p:grpSpPr>
+          <a:xfrm>
+            <a:off x="3760546" y="4373588"/>
+            <a:ext cx="3772657" cy="369332"/>
+            <a:chOff x="3760546" y="2607504"/>
+            <a:chExt cx="3772657" cy="369332"/>
+          </a:xfrm>
+          <a:noFill/>
+        </p:grpSpPr>
+        <p:sp>
+          <p:nvSpPr>
+            <p:cNvPr id="33" name="Rectangle 32">
+              <a:extLst>
+                <a:ext uri="{FF2B5EF4-FFF2-40B4-BE49-F238E27FC236}">
+                  <a16:creationId xmlns:a16="http://schemas.microsoft.com/office/drawing/2014/main" id="{FBAC9D95-347C-A510-D0AA-DFA7B1ACB707}"/>
+                </a:ext>
+              </a:extLst>
+            </p:cNvPr>
+            <p:cNvSpPr/>
+            <p:nvPr/>
+          </p:nvSpPr>
+          <p:spPr>
+            <a:xfrm>
+              <a:off x="3760546" y="2607504"/>
+              <a:ext cx="3772657" cy="369332"/>
+            </a:xfrm>
+            <a:prstGeom prst="rect">
+              <a:avLst/>
+            </a:prstGeom>
+            <a:grpFill/>
+            <a:ln>
+              <a:solidFill>
+                <a:srgbClr val="92D050"/>
+              </a:solidFill>
+            </a:ln>
+          </p:spPr>
+          <p:style>
+            <a:lnRef idx="2">
+              <a:schemeClr val="accent1">
+                <a:shade val="50000"/>
+              </a:schemeClr>
+            </a:lnRef>
+            <a:fillRef idx="1">
+              <a:schemeClr val="accent1"/>
+            </a:fillRef>
+            <a:effectRef idx="0">
+              <a:schemeClr val="accent1"/>
+            </a:effectRef>
+            <a:fontRef idx="minor">
+              <a:schemeClr val="lt1"/>
+            </a:fontRef>
+          </p:style>
+          <p:txBody>
+            <a:bodyPr rtlCol="0" anchor="ctr"/>
+            <a:lstStyle/>
+            <a:p>
+              <a:pPr algn="ctr"/>
+              <a:endParaRPr lang="en-CA" dirty="0">
+                <a:ln>
+                  <a:solidFill>
+                    <a:srgbClr val="3B3838"/>
+                  </a:solidFill>
+                </a:ln>
+              </a:endParaRPr>
+            </a:p>
+          </p:txBody>
+        </p:sp>
+        <p:sp>
+          <p:nvSpPr>
+            <p:cNvPr id="34" name="TextBox 33">
+              <a:extLst>
+                <a:ext uri="{FF2B5EF4-FFF2-40B4-BE49-F238E27FC236}">
+                  <a16:creationId xmlns:a16="http://schemas.microsoft.com/office/drawing/2014/main" id="{38DC9F46-391F-3863-A4A0-7A693E75569B}"/>
+                </a:ext>
+              </a:extLst>
+            </p:cNvPr>
+            <p:cNvSpPr txBox="1"/>
+            <p:nvPr/>
+          </p:nvSpPr>
+          <p:spPr>
+            <a:xfrm>
+              <a:off x="3794508" y="2634095"/>
+              <a:ext cx="1369606" cy="276999"/>
+            </a:xfrm>
+            <a:prstGeom prst="rect">
+              <a:avLst/>
+            </a:prstGeom>
+            <a:grpFill/>
+            <a:ln>
+              <a:solidFill>
+                <a:srgbClr val="92D050"/>
+              </a:solidFill>
+            </a:ln>
+          </p:spPr>
+          <p:txBody>
+            <a:bodyPr wrap="none" rtlCol="0">
+              <a:spAutoFit/>
+            </a:bodyPr>
+            <a:lstStyle/>
+            <a:p>
+              <a:r>
+                <a:rPr lang="en-CA" sz="1200" dirty="0"/>
+                <a:t>Postal Code: MUST</a:t>
+              </a:r>
+            </a:p>
+          </p:txBody>
+        </p:sp>
+      </p:grpSp>
+      <p:sp>
+        <p:nvSpPr>
+          <p:cNvPr id="36" name="Rectangle 35">
+            <a:extLst>
+              <a:ext uri="{FF2B5EF4-FFF2-40B4-BE49-F238E27FC236}">
+                <a16:creationId xmlns:a16="http://schemas.microsoft.com/office/drawing/2014/main" id="{D702BC71-A153-A585-1025-B7BC9651E624}"/>
+              </a:ext>
+            </a:extLst>
+          </p:cNvPr>
+          <p:cNvSpPr/>
+          <p:nvPr/>
+        </p:nvSpPr>
+        <p:spPr>
+          <a:xfrm>
+            <a:off x="3760546" y="3006712"/>
+            <a:ext cx="3772657" cy="369332"/>
+          </a:xfrm>
+          <a:prstGeom prst="rect">
+            <a:avLst/>
+          </a:prstGeom>
+          <a:noFill/>
+          <a:ln>
+            <a:solidFill>
+              <a:srgbClr val="92D050"/>
+            </a:solidFill>
+          </a:ln>
+        </p:spPr>
+        <p:style>
+          <a:lnRef idx="2">
+            <a:schemeClr val="accent1">
+              <a:shade val="50000"/>
+            </a:schemeClr>
+          </a:lnRef>
+          <a:fillRef idx="1">
+            <a:schemeClr val="accent1"/>
+          </a:fillRef>
+          <a:effectRef idx="0">
+            <a:schemeClr val="accent1"/>
+          </a:effectRef>
+          <a:fontRef idx="minor">
+            <a:schemeClr val="lt1"/>
+          </a:fontRef>
+        </p:style>
+        <p:txBody>
+          <a:bodyPr rtlCol="0" anchor="ctr"/>
+          <a:lstStyle/>
+          <a:p>
+            <a:pPr algn="ctr"/>
+            <a:endParaRPr lang="en-CA" dirty="0">
+              <a:ln>
+                <a:solidFill>
+                  <a:srgbClr val="3B3838"/>
+                </a:solidFill>
+              </a:ln>
+            </a:endParaRPr>
+          </a:p>
+        </p:txBody>
+      </p:sp>
+      <p:sp>
+        <p:nvSpPr>
+          <p:cNvPr id="37" name="TextBox 36">
+            <a:extLst>
+              <a:ext uri="{FF2B5EF4-FFF2-40B4-BE49-F238E27FC236}">
+                <a16:creationId xmlns:a16="http://schemas.microsoft.com/office/drawing/2014/main" id="{AE50A293-ADA8-94BB-E321-B0DFB277FDDD}"/>
+              </a:ext>
+            </a:extLst>
+          </p:cNvPr>
+          <p:cNvSpPr txBox="1"/>
+          <p:nvPr/>
+        </p:nvSpPr>
+        <p:spPr>
+          <a:xfrm>
+            <a:off x="5969816" y="3051000"/>
+            <a:ext cx="1369606" cy="276999"/>
+          </a:xfrm>
+          <a:prstGeom prst="rect">
+            <a:avLst/>
+          </a:prstGeom>
+          <a:noFill/>
+          <a:ln>
+            <a:solidFill>
+              <a:srgbClr val="92D050"/>
+            </a:solidFill>
+          </a:ln>
+        </p:spPr>
+        <p:txBody>
+          <a:bodyPr wrap="square" rtlCol="0">
+            <a:spAutoFit/>
+          </a:bodyPr>
+          <a:lstStyle/>
+          <a:p>
+            <a:r>
+              <a:rPr lang="en-CA" sz="1200" dirty="0"/>
+              <a:t>Phone #</a:t>
+            </a:r>
+          </a:p>
+        </p:txBody>
+      </p:sp>
+      <p:grpSp>
+        <p:nvGrpSpPr>
+          <p:cNvPr id="39" name="Group 38">
+            <a:extLst>
+              <a:ext uri="{FF2B5EF4-FFF2-40B4-BE49-F238E27FC236}">
+                <a16:creationId xmlns:a16="http://schemas.microsoft.com/office/drawing/2014/main" id="{5178DF64-C3BA-0A6C-9B6C-0847FF6FC9F9}"/>
+              </a:ext>
+            </a:extLst>
+          </p:cNvPr>
+          <p:cNvGrpSpPr/>
+          <p:nvPr/>
+        </p:nvGrpSpPr>
+        <p:grpSpPr>
+          <a:xfrm>
+            <a:off x="4558479" y="4819490"/>
+            <a:ext cx="1374627" cy="484451"/>
+            <a:chOff x="6008194" y="4774859"/>
+            <a:chExt cx="1374627" cy="484451"/>
+          </a:xfrm>
+        </p:grpSpPr>
+        <p:sp>
+          <p:nvSpPr>
+            <p:cNvPr id="40" name="Rectangle: Rounded Corners 39">
+              <a:extLst>
+                <a:ext uri="{FF2B5EF4-FFF2-40B4-BE49-F238E27FC236}">
+                  <a16:creationId xmlns:a16="http://schemas.microsoft.com/office/drawing/2014/main" id="{7BC813B2-D8DF-9ED1-FEF0-7747662CC7EB}"/>
+                </a:ext>
+              </a:extLst>
+            </p:cNvPr>
+            <p:cNvSpPr/>
+            <p:nvPr/>
+          </p:nvSpPr>
+          <p:spPr>
+            <a:xfrm>
+              <a:off x="6008194" y="4774859"/>
+              <a:ext cx="1374627" cy="484451"/>
+            </a:xfrm>
+            <a:prstGeom prst="roundRect">
+              <a:avLst/>
+            </a:prstGeom>
+            <a:noFill/>
+          </p:spPr>
+          <p:style>
+            <a:lnRef idx="2">
+              <a:schemeClr val="accent1">
+                <a:shade val="50000"/>
+              </a:schemeClr>
+            </a:lnRef>
+            <a:fillRef idx="1">
+              <a:schemeClr val="accent1"/>
+            </a:fillRef>
+            <a:effectRef idx="0">
+              <a:schemeClr val="accent1"/>
+            </a:effectRef>
+            <a:fontRef idx="minor">
+              <a:schemeClr val="lt1"/>
+            </a:fontRef>
+          </p:style>
+          <p:txBody>
+            <a:bodyPr rtlCol="0" anchor="ctr"/>
+            <a:lstStyle/>
+            <a:p>
+              <a:pPr algn="ctr"/>
+              <a:endParaRPr lang="en-CA"/>
+            </a:p>
+          </p:txBody>
+        </p:sp>
+        <p:sp>
+          <p:nvSpPr>
+            <p:cNvPr id="41" name="TextBox 40">
+              <a:extLst>
+                <a:ext uri="{FF2B5EF4-FFF2-40B4-BE49-F238E27FC236}">
+                  <a16:creationId xmlns:a16="http://schemas.microsoft.com/office/drawing/2014/main" id="{B536C88E-6DF9-4159-404B-1E1E671B8774}"/>
+                </a:ext>
+              </a:extLst>
+            </p:cNvPr>
+            <p:cNvSpPr txBox="1"/>
+            <p:nvPr/>
+          </p:nvSpPr>
+          <p:spPr>
+            <a:xfrm>
+              <a:off x="6357114" y="4890491"/>
+              <a:ext cx="676788" cy="276999"/>
+            </a:xfrm>
+            <a:prstGeom prst="rect">
+              <a:avLst/>
+            </a:prstGeom>
+            <a:noFill/>
+          </p:spPr>
+          <p:txBody>
+            <a:bodyPr wrap="none" rtlCol="0">
+              <a:spAutoFit/>
+            </a:bodyPr>
+            <a:lstStyle/>
+            <a:p>
+              <a:pPr algn="ctr"/>
+              <a:r>
+                <a:rPr lang="en-CA" sz="1200" dirty="0"/>
+                <a:t>CANCEL</a:t>
+              </a:r>
+            </a:p>
+          </p:txBody>
+        </p:sp>
+      </p:grpSp>
+    </p:spTree>
+    <p:extLst>
+      <p:ext uri="{BB962C8B-B14F-4D97-AF65-F5344CB8AC3E}">
+        <p14:creationId xmlns:p14="http://schemas.microsoft.com/office/powerpoint/2010/main" val="117847562"/>
+      </p:ext>
+    </p:extLst>
+  </p:cSld>
+  <p:clrMapOvr>
+    <a:masterClrMapping/>
+  </p:clrMapOvr>
+</p:sld>
+</file>
+
+<file path=ppt/slides/slide11.xml><?xml version="1.0" encoding="utf-8"?>
+<p:sld xmlns:a="http://schemas.openxmlformats.org/drawingml/2006/main" xmlns:r="http://schemas.openxmlformats.org/officeDocument/2006/relationships" xmlns:p="http://schemas.openxmlformats.org/presentationml/2006/main">
+  <p:cSld>
+    <p:spTree>
+      <p:nvGrpSpPr>
+        <p:cNvPr id="1" name=""/>
+        <p:cNvGrpSpPr/>
+        <p:nvPr/>
+      </p:nvGrpSpPr>
+      <p:grpSpPr>
+        <a:xfrm>
+          <a:off x="0" y="0"/>
+          <a:ext cx="0" cy="0"/>
+          <a:chOff x="0" y="0"/>
+          <a:chExt cx="0" cy="0"/>
+        </a:xfrm>
+      </p:grpSpPr>
+      <p:sp>
+        <p:nvSpPr>
+          <p:cNvPr id="47" name="Rectangle 46">
+            <a:extLst>
+              <a:ext uri="{FF2B5EF4-FFF2-40B4-BE49-F238E27FC236}">
+                <a16:creationId xmlns:a16="http://schemas.microsoft.com/office/drawing/2014/main" id="{C150D3E8-9D49-417F-51B4-D514A72D2162}"/>
+              </a:ext>
+            </a:extLst>
+          </p:cNvPr>
+          <p:cNvSpPr/>
+          <p:nvPr/>
+        </p:nvSpPr>
+        <p:spPr>
+          <a:xfrm>
+            <a:off x="3560514" y="2874656"/>
+            <a:ext cx="3772657" cy="369332"/>
+          </a:xfrm>
+          <a:prstGeom prst="rect">
+            <a:avLst/>
+          </a:prstGeom>
+          <a:solidFill>
+            <a:schemeClr val="bg1">
+              <a:lumMod val="95000"/>
+            </a:schemeClr>
+          </a:solidFill>
+          <a:ln>
+            <a:solidFill>
+              <a:srgbClr val="CE9178"/>
+            </a:solidFill>
+          </a:ln>
+        </p:spPr>
+        <p:style>
+          <a:lnRef idx="2">
+            <a:schemeClr val="accent1">
+              <a:shade val="50000"/>
+            </a:schemeClr>
+          </a:lnRef>
+          <a:fillRef idx="1">
+            <a:schemeClr val="accent1"/>
+          </a:fillRef>
+          <a:effectRef idx="0">
+            <a:schemeClr val="accent1"/>
+          </a:effectRef>
+          <a:fontRef idx="minor">
+            <a:schemeClr val="lt1"/>
+          </a:fontRef>
+        </p:style>
+        <p:txBody>
+          <a:bodyPr rtlCol="0" anchor="ctr"/>
+          <a:lstStyle/>
+          <a:p>
+            <a:pPr algn="ctr"/>
+            <a:endParaRPr lang="en-CA" dirty="0">
+              <a:ln>
+                <a:solidFill>
+                  <a:srgbClr val="3B3838"/>
+                </a:solidFill>
+              </a:ln>
+            </a:endParaRPr>
+          </a:p>
+        </p:txBody>
+      </p:sp>
+      <p:sp>
+        <p:nvSpPr>
+          <p:cNvPr id="45" name="Rectangle 44">
+            <a:extLst>
+              <a:ext uri="{FF2B5EF4-FFF2-40B4-BE49-F238E27FC236}">
+                <a16:creationId xmlns:a16="http://schemas.microsoft.com/office/drawing/2014/main" id="{FF7A89D7-85CB-E228-1394-1E750B601E88}"/>
+              </a:ext>
+            </a:extLst>
+          </p:cNvPr>
+          <p:cNvSpPr/>
+          <p:nvPr/>
+        </p:nvSpPr>
+        <p:spPr>
+          <a:xfrm>
+            <a:off x="3587777" y="3791264"/>
+            <a:ext cx="1678489" cy="1507579"/>
+          </a:xfrm>
+          <a:prstGeom prst="rect">
+            <a:avLst/>
+          </a:prstGeom>
+          <a:solidFill>
+            <a:schemeClr val="bg1">
+              <a:lumMod val="95000"/>
+            </a:schemeClr>
+          </a:solidFill>
+          <a:ln>
+            <a:solidFill>
+              <a:srgbClr val="CE9178"/>
+            </a:solidFill>
+          </a:ln>
+        </p:spPr>
+        <p:style>
+          <a:lnRef idx="2">
+            <a:schemeClr val="accent1">
+              <a:shade val="50000"/>
+            </a:schemeClr>
+          </a:lnRef>
+          <a:fillRef idx="1">
+            <a:schemeClr val="accent1"/>
+          </a:fillRef>
+          <a:effectRef idx="0">
+            <a:schemeClr val="accent1"/>
+          </a:effectRef>
+          <a:fontRef idx="minor">
+            <a:schemeClr val="lt1"/>
+          </a:fontRef>
+        </p:style>
+        <p:txBody>
+          <a:bodyPr rtlCol="0" anchor="ctr"/>
+          <a:lstStyle/>
+          <a:p>
+            <a:pPr algn="ctr"/>
+            <a:endParaRPr lang="en-CA" dirty="0">
+              <a:ln>
+                <a:solidFill>
+                  <a:srgbClr val="3B3838"/>
+                </a:solidFill>
+              </a:ln>
+            </a:endParaRPr>
+          </a:p>
+        </p:txBody>
+      </p:sp>
+      <p:sp>
+        <p:nvSpPr>
+          <p:cNvPr id="4" name="Rectangle 3">
+            <a:extLst>
+              <a:ext uri="{FF2B5EF4-FFF2-40B4-BE49-F238E27FC236}">
+                <a16:creationId xmlns:a16="http://schemas.microsoft.com/office/drawing/2014/main" id="{B795878D-4133-CFAC-832E-3F2359F2F836}"/>
+              </a:ext>
+            </a:extLst>
+          </p:cNvPr>
+          <p:cNvSpPr/>
+          <p:nvPr/>
+        </p:nvSpPr>
+        <p:spPr>
+          <a:xfrm>
+            <a:off x="1186903" y="823566"/>
+            <a:ext cx="6576414" cy="5413732"/>
+          </a:xfrm>
+          <a:prstGeom prst="rect">
+            <a:avLst/>
+          </a:prstGeom>
+          <a:noFill/>
+          <a:ln>
+            <a:solidFill>
+              <a:srgbClr val="3B3838"/>
+            </a:solidFill>
+          </a:ln>
+        </p:spPr>
+        <p:style>
+          <a:lnRef idx="2">
+            <a:schemeClr val="accent1">
+              <a:shade val="50000"/>
+            </a:schemeClr>
+          </a:lnRef>
+          <a:fillRef idx="1">
+            <a:schemeClr val="accent1"/>
+          </a:fillRef>
+          <a:effectRef idx="0">
+            <a:schemeClr val="accent1"/>
+          </a:effectRef>
+          <a:fontRef idx="minor">
+            <a:schemeClr val="lt1"/>
+          </a:fontRef>
+        </p:style>
+        <p:txBody>
+          <a:bodyPr rtlCol="0" anchor="ctr"/>
+          <a:lstStyle/>
+          <a:p>
+            <a:pPr algn="ctr"/>
+            <a:endParaRPr lang="en-CA"/>
+          </a:p>
+        </p:txBody>
+      </p:sp>
+      <p:sp>
+        <p:nvSpPr>
+          <p:cNvPr id="5" name="Rectangle 4">
+            <a:extLst>
+              <a:ext uri="{FF2B5EF4-FFF2-40B4-BE49-F238E27FC236}">
+                <a16:creationId xmlns:a16="http://schemas.microsoft.com/office/drawing/2014/main" id="{75A1C56A-A625-E469-A2E0-7CEE76EB6F87}"/>
+              </a:ext>
+            </a:extLst>
+          </p:cNvPr>
+          <p:cNvSpPr/>
+          <p:nvPr/>
+        </p:nvSpPr>
+        <p:spPr>
+          <a:xfrm>
+            <a:off x="1259571" y="896233"/>
+            <a:ext cx="6418967" cy="1314072"/>
+          </a:xfrm>
+          <a:prstGeom prst="rect">
+            <a:avLst/>
+          </a:prstGeom>
+          <a:noFill/>
+          <a:ln>
+            <a:solidFill>
+              <a:srgbClr val="CE9178"/>
+            </a:solidFill>
+          </a:ln>
+        </p:spPr>
+        <p:style>
+          <a:lnRef idx="2">
+            <a:schemeClr val="accent1">
+              <a:shade val="50000"/>
+            </a:schemeClr>
+          </a:lnRef>
+          <a:fillRef idx="1">
+            <a:schemeClr val="accent1"/>
+          </a:fillRef>
+          <a:effectRef idx="0">
+            <a:schemeClr val="accent1"/>
+          </a:effectRef>
+          <a:fontRef idx="minor">
+            <a:schemeClr val="lt1"/>
+          </a:fontRef>
+        </p:style>
+        <p:txBody>
+          <a:bodyPr rtlCol="0" anchor="ctr"/>
+          <a:lstStyle/>
+          <a:p>
+            <a:pPr algn="ctr"/>
+            <a:endParaRPr lang="en-CA"/>
+          </a:p>
+        </p:txBody>
+      </p:sp>
+      <p:cxnSp>
+        <p:nvCxnSpPr>
+          <p:cNvPr id="8" name="Straight Connector 7">
+            <a:extLst>
+              <a:ext uri="{FF2B5EF4-FFF2-40B4-BE49-F238E27FC236}">
+                <a16:creationId xmlns:a16="http://schemas.microsoft.com/office/drawing/2014/main" id="{34B0335A-7E65-4D8E-05FC-8A4EB2805A26}"/>
+              </a:ext>
+            </a:extLst>
+          </p:cNvPr>
+          <p:cNvCxnSpPr/>
+          <p:nvPr/>
+        </p:nvCxnSpPr>
+        <p:spPr>
+          <a:xfrm>
+            <a:off x="7145642" y="1968079"/>
+            <a:ext cx="387561" cy="0"/>
+          </a:xfrm>
+          <a:prstGeom prst="line">
+            <a:avLst/>
+          </a:prstGeom>
+        </p:spPr>
+        <p:style>
+          <a:lnRef idx="1">
+            <a:schemeClr val="accent1"/>
+          </a:lnRef>
+          <a:fillRef idx="0">
+            <a:schemeClr val="accent1"/>
+          </a:fillRef>
+          <a:effectRef idx="0">
+            <a:schemeClr val="accent1"/>
+          </a:effectRef>
+          <a:fontRef idx="minor">
+            <a:schemeClr val="tx1"/>
+          </a:fontRef>
+        </p:style>
+      </p:cxnSp>
+      <p:cxnSp>
+        <p:nvCxnSpPr>
+          <p:cNvPr id="9" name="Straight Connector 8">
+            <a:extLst>
+              <a:ext uri="{FF2B5EF4-FFF2-40B4-BE49-F238E27FC236}">
+                <a16:creationId xmlns:a16="http://schemas.microsoft.com/office/drawing/2014/main" id="{A55971C4-0F6D-3DD5-F248-FBC8A28B560D}"/>
+              </a:ext>
+            </a:extLst>
+          </p:cNvPr>
+          <p:cNvCxnSpPr/>
+          <p:nvPr/>
+        </p:nvCxnSpPr>
+        <p:spPr>
+          <a:xfrm>
+            <a:off x="7145642" y="2120479"/>
+            <a:ext cx="387561" cy="0"/>
+          </a:xfrm>
+          <a:prstGeom prst="line">
+            <a:avLst/>
+          </a:prstGeom>
+        </p:spPr>
+        <p:style>
+          <a:lnRef idx="1">
+            <a:schemeClr val="accent1"/>
+          </a:lnRef>
+          <a:fillRef idx="0">
+            <a:schemeClr val="accent1"/>
+          </a:fillRef>
+          <a:effectRef idx="0">
+            <a:schemeClr val="accent1"/>
+          </a:effectRef>
+          <a:fontRef idx="minor">
+            <a:schemeClr val="tx1"/>
+          </a:fontRef>
+        </p:style>
+      </p:cxnSp>
+      <p:cxnSp>
+        <p:nvCxnSpPr>
+          <p:cNvPr id="10" name="Straight Connector 9">
+            <a:extLst>
+              <a:ext uri="{FF2B5EF4-FFF2-40B4-BE49-F238E27FC236}">
+                <a16:creationId xmlns:a16="http://schemas.microsoft.com/office/drawing/2014/main" id="{A1815CA1-36F9-315C-8173-8E00AD441B48}"/>
+              </a:ext>
+            </a:extLst>
+          </p:cNvPr>
+          <p:cNvCxnSpPr/>
+          <p:nvPr/>
+        </p:nvCxnSpPr>
+        <p:spPr>
+          <a:xfrm>
+            <a:off x="7145642" y="2024598"/>
+            <a:ext cx="387561" cy="0"/>
+          </a:xfrm>
+          <a:prstGeom prst="line">
+            <a:avLst/>
+          </a:prstGeom>
+        </p:spPr>
+        <p:style>
+          <a:lnRef idx="1">
+            <a:schemeClr val="accent1"/>
+          </a:lnRef>
+          <a:fillRef idx="0">
+            <a:schemeClr val="accent1"/>
+          </a:fillRef>
+          <a:effectRef idx="0">
+            <a:schemeClr val="accent1"/>
+          </a:effectRef>
+          <a:fontRef idx="minor">
+            <a:schemeClr val="tx1"/>
+          </a:fontRef>
+        </p:style>
+      </p:cxnSp>
+      <p:cxnSp>
+        <p:nvCxnSpPr>
+          <p:cNvPr id="11" name="Straight Connector 10">
+            <a:extLst>
+              <a:ext uri="{FF2B5EF4-FFF2-40B4-BE49-F238E27FC236}">
+                <a16:creationId xmlns:a16="http://schemas.microsoft.com/office/drawing/2014/main" id="{D24A2F27-F7BE-EDD0-B5D2-BB93D40D6ED5}"/>
+              </a:ext>
+            </a:extLst>
+          </p:cNvPr>
+          <p:cNvCxnSpPr/>
+          <p:nvPr/>
+        </p:nvCxnSpPr>
+        <p:spPr>
+          <a:xfrm>
+            <a:off x="7145642" y="2071021"/>
+            <a:ext cx="387561" cy="0"/>
+          </a:xfrm>
+          <a:prstGeom prst="line">
+            <a:avLst/>
+          </a:prstGeom>
+        </p:spPr>
+        <p:style>
+          <a:lnRef idx="1">
+            <a:schemeClr val="accent1"/>
+          </a:lnRef>
+          <a:fillRef idx="0">
+            <a:schemeClr val="accent1"/>
+          </a:fillRef>
+          <a:effectRef idx="0">
+            <a:schemeClr val="accent1"/>
+          </a:effectRef>
+          <a:fontRef idx="minor">
+            <a:schemeClr val="tx1"/>
+          </a:fontRef>
+        </p:style>
+      </p:cxnSp>
+      <p:sp>
+        <p:nvSpPr>
+          <p:cNvPr id="14" name="Rectangle 13">
+            <a:extLst>
+              <a:ext uri="{FF2B5EF4-FFF2-40B4-BE49-F238E27FC236}">
+                <a16:creationId xmlns:a16="http://schemas.microsoft.com/office/drawing/2014/main" id="{45488D2F-DF9C-0A51-91A4-9F2E3823728F}"/>
+              </a:ext>
+            </a:extLst>
+          </p:cNvPr>
+          <p:cNvSpPr/>
+          <p:nvPr/>
+        </p:nvSpPr>
+        <p:spPr>
+          <a:xfrm>
+            <a:off x="3512264" y="2416192"/>
+            <a:ext cx="4166273" cy="3015703"/>
+          </a:xfrm>
+          <a:prstGeom prst="rect">
+            <a:avLst/>
+          </a:prstGeom>
+          <a:noFill/>
+        </p:spPr>
+        <p:style>
+          <a:lnRef idx="2">
+            <a:schemeClr val="accent1">
+              <a:shade val="50000"/>
+            </a:schemeClr>
+          </a:lnRef>
+          <a:fillRef idx="1">
+            <a:schemeClr val="accent1"/>
+          </a:fillRef>
+          <a:effectRef idx="0">
+            <a:schemeClr val="accent1"/>
+          </a:effectRef>
+          <a:fontRef idx="minor">
+            <a:schemeClr val="lt1"/>
+          </a:fontRef>
+        </p:style>
+        <p:txBody>
+          <a:bodyPr rtlCol="0" anchor="ctr"/>
+          <a:lstStyle/>
+          <a:p>
+            <a:pPr algn="ctr"/>
+            <a:endParaRPr lang="en-CA"/>
+          </a:p>
+        </p:txBody>
+      </p:sp>
+      <p:sp>
+        <p:nvSpPr>
+          <p:cNvPr id="15" name="TextBox 14">
+            <a:extLst>
+              <a:ext uri="{FF2B5EF4-FFF2-40B4-BE49-F238E27FC236}">
+                <a16:creationId xmlns:a16="http://schemas.microsoft.com/office/drawing/2014/main" id="{29A2FCD0-29D2-9C67-D8E7-69C9C184ABDF}"/>
+              </a:ext>
+            </a:extLst>
+          </p:cNvPr>
+          <p:cNvSpPr txBox="1"/>
+          <p:nvPr/>
+        </p:nvSpPr>
+        <p:spPr>
+          <a:xfrm>
+            <a:off x="2105584" y="1288610"/>
+            <a:ext cx="3074240" cy="369332"/>
+          </a:xfrm>
+          <a:prstGeom prst="rect">
+            <a:avLst/>
+          </a:prstGeom>
+          <a:noFill/>
+        </p:spPr>
+        <p:txBody>
+          <a:bodyPr wrap="none" rtlCol="0">
+            <a:spAutoFit/>
+          </a:bodyPr>
+          <a:lstStyle/>
+          <a:p>
+            <a:r>
+              <a:rPr lang="en-CA" dirty="0"/>
+              <a:t>Display Appointment info page</a:t>
+            </a:r>
+          </a:p>
+        </p:txBody>
+      </p:sp>
+      <p:grpSp>
+        <p:nvGrpSpPr>
+          <p:cNvPr id="3" name="Group 2">
+            <a:extLst>
+              <a:ext uri="{FF2B5EF4-FFF2-40B4-BE49-F238E27FC236}">
+                <a16:creationId xmlns:a16="http://schemas.microsoft.com/office/drawing/2014/main" id="{6BDFC24D-C15D-5116-8278-3310EA0E4B8C}"/>
+              </a:ext>
+            </a:extLst>
+          </p:cNvPr>
+          <p:cNvGrpSpPr/>
+          <p:nvPr/>
+        </p:nvGrpSpPr>
+        <p:grpSpPr>
+          <a:xfrm>
+            <a:off x="5478434" y="1771733"/>
+            <a:ext cx="1104035" cy="339256"/>
+            <a:chOff x="6008194" y="4774859"/>
+            <a:chExt cx="1374627" cy="484451"/>
+          </a:xfrm>
+        </p:grpSpPr>
+        <p:sp>
+          <p:nvSpPr>
+            <p:cNvPr id="16" name="Rectangle: Rounded Corners 15">
+              <a:extLst>
+                <a:ext uri="{FF2B5EF4-FFF2-40B4-BE49-F238E27FC236}">
+                  <a16:creationId xmlns:a16="http://schemas.microsoft.com/office/drawing/2014/main" id="{B4FFC496-018F-2087-117B-D26F9558CEF2}"/>
+                </a:ext>
+              </a:extLst>
+            </p:cNvPr>
+            <p:cNvSpPr/>
+            <p:nvPr/>
+          </p:nvSpPr>
+          <p:spPr>
+            <a:xfrm>
+              <a:off x="6008194" y="4774859"/>
+              <a:ext cx="1374627" cy="484451"/>
+            </a:xfrm>
+            <a:prstGeom prst="roundRect">
+              <a:avLst/>
+            </a:prstGeom>
+            <a:noFill/>
+          </p:spPr>
+          <p:style>
+            <a:lnRef idx="2">
+              <a:schemeClr val="accent1">
+                <a:shade val="50000"/>
+              </a:schemeClr>
+            </a:lnRef>
+            <a:fillRef idx="1">
+              <a:schemeClr val="accent1"/>
+            </a:fillRef>
+            <a:effectRef idx="0">
+              <a:schemeClr val="accent1"/>
+            </a:effectRef>
+            <a:fontRef idx="minor">
+              <a:schemeClr val="lt1"/>
+            </a:fontRef>
+          </p:style>
+          <p:txBody>
+            <a:bodyPr rtlCol="0" anchor="ctr"/>
+            <a:lstStyle/>
+            <a:p>
+              <a:pPr algn="ctr"/>
+              <a:endParaRPr lang="en-CA"/>
+            </a:p>
+          </p:txBody>
+        </p:sp>
+        <p:sp>
+          <p:nvSpPr>
+            <p:cNvPr id="17" name="TextBox 16">
+              <a:extLst>
+                <a:ext uri="{FF2B5EF4-FFF2-40B4-BE49-F238E27FC236}">
+                  <a16:creationId xmlns:a16="http://schemas.microsoft.com/office/drawing/2014/main" id="{116E42F5-A7D7-0E72-E38B-36C40EE3B91E}"/>
+                </a:ext>
+              </a:extLst>
+            </p:cNvPr>
+            <p:cNvSpPr txBox="1"/>
+            <p:nvPr/>
+          </p:nvSpPr>
+          <p:spPr>
+            <a:xfrm>
+              <a:off x="6394350" y="4811193"/>
+              <a:ext cx="641080" cy="395549"/>
+            </a:xfrm>
+            <a:prstGeom prst="rect">
+              <a:avLst/>
+            </a:prstGeom>
+            <a:noFill/>
+          </p:spPr>
+          <p:txBody>
+            <a:bodyPr wrap="none" rtlCol="0">
+              <a:spAutoFit/>
+            </a:bodyPr>
+            <a:lstStyle/>
+            <a:p>
+              <a:pPr algn="ctr"/>
+              <a:r>
+                <a:rPr lang="en-CA" sz="1200" dirty="0"/>
+                <a:t>NEXT</a:t>
+              </a:r>
+            </a:p>
+          </p:txBody>
+        </p:sp>
+      </p:grpSp>
+      <p:sp>
+        <p:nvSpPr>
+          <p:cNvPr id="18" name="Rectangle 17">
+            <a:extLst>
+              <a:ext uri="{FF2B5EF4-FFF2-40B4-BE49-F238E27FC236}">
+                <a16:creationId xmlns:a16="http://schemas.microsoft.com/office/drawing/2014/main" id="{7CAB7197-E4C5-161A-BCFC-6368648AF9BA}"/>
+              </a:ext>
+            </a:extLst>
+          </p:cNvPr>
+          <p:cNvSpPr/>
+          <p:nvPr/>
+        </p:nvSpPr>
+        <p:spPr>
+          <a:xfrm>
+            <a:off x="1259571" y="5574207"/>
+            <a:ext cx="6418967" cy="638746"/>
+          </a:xfrm>
+          <a:prstGeom prst="rect">
+            <a:avLst/>
+          </a:prstGeom>
+          <a:noFill/>
+          <a:ln>
+            <a:solidFill>
+              <a:srgbClr val="CE9178"/>
+            </a:solidFill>
+          </a:ln>
+        </p:spPr>
+        <p:style>
+          <a:lnRef idx="2">
+            <a:schemeClr val="accent1">
+              <a:shade val="50000"/>
+            </a:schemeClr>
+          </a:lnRef>
+          <a:fillRef idx="1">
+            <a:schemeClr val="accent1"/>
+          </a:fillRef>
+          <a:effectRef idx="0">
+            <a:schemeClr val="accent1"/>
+          </a:effectRef>
+          <a:fontRef idx="minor">
+            <a:schemeClr val="lt1"/>
+          </a:fontRef>
+        </p:style>
+        <p:txBody>
+          <a:bodyPr rtlCol="0" anchor="ctr"/>
+          <a:lstStyle/>
+          <a:p>
+            <a:pPr algn="ctr"/>
+            <a:endParaRPr lang="en-CA"/>
+          </a:p>
+        </p:txBody>
+      </p:sp>
+      <p:sp>
+        <p:nvSpPr>
+          <p:cNvPr id="19" name="TextBox 18">
+            <a:extLst>
+              <a:ext uri="{FF2B5EF4-FFF2-40B4-BE49-F238E27FC236}">
+                <a16:creationId xmlns:a16="http://schemas.microsoft.com/office/drawing/2014/main" id="{9DE6D796-9483-ADC1-9CDA-12CFB0B2F40E}"/>
+              </a:ext>
+            </a:extLst>
+          </p:cNvPr>
+          <p:cNvSpPr txBox="1"/>
+          <p:nvPr/>
+        </p:nvSpPr>
+        <p:spPr>
+          <a:xfrm>
+            <a:off x="1702373" y="5634825"/>
+            <a:ext cx="763992" cy="369332"/>
+          </a:xfrm>
+          <a:prstGeom prst="rect">
+            <a:avLst/>
+          </a:prstGeom>
+          <a:noFill/>
+        </p:spPr>
+        <p:txBody>
+          <a:bodyPr wrap="none" rtlCol="0">
+            <a:spAutoFit/>
+          </a:bodyPr>
+          <a:lstStyle/>
+          <a:p>
+            <a:r>
+              <a:rPr lang="en-CA" dirty="0"/>
+              <a:t>footer</a:t>
+            </a:r>
+          </a:p>
+        </p:txBody>
+      </p:sp>
+      <p:sp>
+        <p:nvSpPr>
+          <p:cNvPr id="7" name="Rectangle 6">
+            <a:extLst>
+              <a:ext uri="{FF2B5EF4-FFF2-40B4-BE49-F238E27FC236}">
+                <a16:creationId xmlns:a16="http://schemas.microsoft.com/office/drawing/2014/main" id="{8B5A46A8-367F-3516-BCF8-57E5B30D7991}"/>
+              </a:ext>
+            </a:extLst>
+          </p:cNvPr>
+          <p:cNvSpPr/>
+          <p:nvPr/>
+        </p:nvSpPr>
+        <p:spPr>
+          <a:xfrm>
+            <a:off x="1259571" y="2397902"/>
+            <a:ext cx="2167913" cy="3015703"/>
+          </a:xfrm>
+          <a:prstGeom prst="rect">
+            <a:avLst/>
+          </a:prstGeom>
+          <a:noFill/>
+        </p:spPr>
+        <p:style>
+          <a:lnRef idx="2">
+            <a:schemeClr val="accent1">
+              <a:shade val="50000"/>
+            </a:schemeClr>
+          </a:lnRef>
+          <a:fillRef idx="1">
+            <a:schemeClr val="accent1"/>
+          </a:fillRef>
+          <a:effectRef idx="0">
+            <a:schemeClr val="accent1"/>
+          </a:effectRef>
+          <a:fontRef idx="minor">
+            <a:schemeClr val="lt1"/>
+          </a:fontRef>
+        </p:style>
+        <p:txBody>
+          <a:bodyPr rtlCol="0" anchor="ctr"/>
+          <a:lstStyle/>
+          <a:p>
+            <a:pPr algn="ctr"/>
+            <a:endParaRPr lang="en-CA"/>
+          </a:p>
+        </p:txBody>
+      </p:sp>
+      <p:sp>
+        <p:nvSpPr>
+          <p:cNvPr id="20" name="TextBox 19">
+            <a:extLst>
+              <a:ext uri="{FF2B5EF4-FFF2-40B4-BE49-F238E27FC236}">
+                <a16:creationId xmlns:a16="http://schemas.microsoft.com/office/drawing/2014/main" id="{EEA9051A-857B-AF7C-CF7C-11D1D4F2F3BC}"/>
+              </a:ext>
+            </a:extLst>
+          </p:cNvPr>
+          <p:cNvSpPr txBox="1"/>
+          <p:nvPr/>
+        </p:nvSpPr>
+        <p:spPr>
+          <a:xfrm>
+            <a:off x="3674456" y="3890420"/>
+            <a:ext cx="1441439" cy="738664"/>
+          </a:xfrm>
+          <a:prstGeom prst="rect">
+            <a:avLst/>
+          </a:prstGeom>
+          <a:solidFill>
+            <a:schemeClr val="bg1">
+              <a:lumMod val="95000"/>
+            </a:schemeClr>
+          </a:solidFill>
+          <a:ln>
+            <a:solidFill>
+              <a:srgbClr val="CE9178"/>
+            </a:solidFill>
+          </a:ln>
+        </p:spPr>
+        <p:txBody>
+          <a:bodyPr wrap="square" rtlCol="0">
+            <a:spAutoFit/>
+          </a:bodyPr>
+          <a:lstStyle/>
+          <a:p>
+            <a:r>
+              <a:rPr lang="en-CA" sz="1400" dirty="0"/>
+              <a:t>API #1 – Display</a:t>
+            </a:r>
+          </a:p>
+          <a:p>
+            <a:endParaRPr lang="en-CA" sz="1400" dirty="0"/>
+          </a:p>
+          <a:p>
+            <a:r>
+              <a:rPr lang="en-CA" sz="1400" dirty="0"/>
+              <a:t>Weather info</a:t>
+            </a:r>
+          </a:p>
+        </p:txBody>
+      </p:sp>
+      <p:grpSp>
+        <p:nvGrpSpPr>
+          <p:cNvPr id="6" name="Group 5">
+            <a:extLst>
+              <a:ext uri="{FF2B5EF4-FFF2-40B4-BE49-F238E27FC236}">
+                <a16:creationId xmlns:a16="http://schemas.microsoft.com/office/drawing/2014/main" id="{14C152B2-0E67-6D37-3A87-23EFBD0469E5}"/>
+              </a:ext>
+            </a:extLst>
+          </p:cNvPr>
+          <p:cNvGrpSpPr/>
+          <p:nvPr/>
+        </p:nvGrpSpPr>
+        <p:grpSpPr>
+          <a:xfrm>
+            <a:off x="3560514" y="2475448"/>
+            <a:ext cx="3772657" cy="369332"/>
+            <a:chOff x="3760546" y="2607504"/>
+            <a:chExt cx="3772657" cy="369332"/>
+          </a:xfrm>
+          <a:solidFill>
+            <a:schemeClr val="bg1">
+              <a:lumMod val="95000"/>
+            </a:schemeClr>
+          </a:solidFill>
+        </p:grpSpPr>
+        <p:sp>
+          <p:nvSpPr>
+            <p:cNvPr id="22" name="Rectangle 21">
+              <a:extLst>
+                <a:ext uri="{FF2B5EF4-FFF2-40B4-BE49-F238E27FC236}">
+                  <a16:creationId xmlns:a16="http://schemas.microsoft.com/office/drawing/2014/main" id="{7C394546-21BD-F9B0-717B-9E3F5F434126}"/>
+                </a:ext>
+              </a:extLst>
+            </p:cNvPr>
+            <p:cNvSpPr/>
+            <p:nvPr/>
+          </p:nvSpPr>
+          <p:spPr>
+            <a:xfrm>
+              <a:off x="3760546" y="2607504"/>
+              <a:ext cx="3772657" cy="369332"/>
+            </a:xfrm>
+            <a:prstGeom prst="rect">
+              <a:avLst/>
+            </a:prstGeom>
+            <a:grpFill/>
+            <a:ln>
+              <a:solidFill>
+                <a:srgbClr val="CE9178"/>
+              </a:solidFill>
+            </a:ln>
+          </p:spPr>
+          <p:style>
+            <a:lnRef idx="2">
+              <a:schemeClr val="accent1">
+                <a:shade val="50000"/>
+              </a:schemeClr>
+            </a:lnRef>
+            <a:fillRef idx="1">
+              <a:schemeClr val="accent1"/>
+            </a:fillRef>
+            <a:effectRef idx="0">
+              <a:schemeClr val="accent1"/>
+            </a:effectRef>
+            <a:fontRef idx="minor">
+              <a:schemeClr val="lt1"/>
+            </a:fontRef>
+          </p:style>
+          <p:txBody>
+            <a:bodyPr rtlCol="0" anchor="ctr"/>
+            <a:lstStyle/>
+            <a:p>
+              <a:pPr algn="ctr"/>
+              <a:endParaRPr lang="en-CA" dirty="0">
+                <a:ln>
+                  <a:solidFill>
+                    <a:srgbClr val="3B3838"/>
+                  </a:solidFill>
+                </a:ln>
+              </a:endParaRPr>
+            </a:p>
+          </p:txBody>
+        </p:sp>
+        <p:sp>
+          <p:nvSpPr>
+            <p:cNvPr id="35" name="TextBox 34">
+              <a:extLst>
+                <a:ext uri="{FF2B5EF4-FFF2-40B4-BE49-F238E27FC236}">
+                  <a16:creationId xmlns:a16="http://schemas.microsoft.com/office/drawing/2014/main" id="{8F31287A-1B6F-60F2-17D7-866A7A26A666}"/>
+                </a:ext>
+              </a:extLst>
+            </p:cNvPr>
+            <p:cNvSpPr txBox="1"/>
+            <p:nvPr/>
+          </p:nvSpPr>
+          <p:spPr>
+            <a:xfrm>
+              <a:off x="3794508" y="2634095"/>
+              <a:ext cx="1455848" cy="276999"/>
+            </a:xfrm>
+            <a:prstGeom prst="rect">
+              <a:avLst/>
+            </a:prstGeom>
+            <a:grpFill/>
+            <a:ln>
+              <a:solidFill>
+                <a:srgbClr val="CE9178"/>
+              </a:solidFill>
+            </a:ln>
+          </p:spPr>
+          <p:txBody>
+            <a:bodyPr wrap="none" rtlCol="0">
+              <a:spAutoFit/>
+            </a:bodyPr>
+            <a:lstStyle/>
+            <a:p>
+              <a:r>
+                <a:rPr lang="en-CA" sz="1200" dirty="0"/>
+                <a:t>Customer Full Name</a:t>
+              </a:r>
+            </a:p>
+          </p:txBody>
+        </p:sp>
+      </p:grpSp>
+      <p:sp>
+        <p:nvSpPr>
+          <p:cNvPr id="36" name="TextBox 35">
+            <a:extLst>
+              <a:ext uri="{FF2B5EF4-FFF2-40B4-BE49-F238E27FC236}">
+                <a16:creationId xmlns:a16="http://schemas.microsoft.com/office/drawing/2014/main" id="{D87C9226-2DCF-4D4E-EDA1-E202E3AC7A09}"/>
+              </a:ext>
+            </a:extLst>
+          </p:cNvPr>
+          <p:cNvSpPr txBox="1"/>
+          <p:nvPr/>
+        </p:nvSpPr>
+        <p:spPr>
+          <a:xfrm>
+            <a:off x="5281616" y="2485228"/>
+            <a:ext cx="1628768" cy="307777"/>
+          </a:xfrm>
+          <a:prstGeom prst="rect">
+            <a:avLst/>
+          </a:prstGeom>
+          <a:solidFill>
+            <a:schemeClr val="bg1">
+              <a:lumMod val="95000"/>
+            </a:schemeClr>
+          </a:solidFill>
+          <a:ln>
+            <a:solidFill>
+              <a:srgbClr val="CE9178"/>
+            </a:solidFill>
+          </a:ln>
+        </p:spPr>
+        <p:txBody>
+          <a:bodyPr wrap="square" rtlCol="0">
+            <a:spAutoFit/>
+          </a:bodyPr>
+          <a:lstStyle/>
+          <a:p>
+            <a:pPr>
+              <a:tabLst>
+                <a:tab pos="714375" algn="l"/>
+              </a:tabLst>
+            </a:pPr>
+            <a:r>
+              <a:rPr lang="en-CA" sz="1400" dirty="0"/>
+              <a:t>Date time-slot</a:t>
+            </a:r>
+          </a:p>
+        </p:txBody>
+      </p:sp>
+      <p:sp>
+        <p:nvSpPr>
+          <p:cNvPr id="37" name="Rectangle 36">
+            <a:extLst>
+              <a:ext uri="{FF2B5EF4-FFF2-40B4-BE49-F238E27FC236}">
+                <a16:creationId xmlns:a16="http://schemas.microsoft.com/office/drawing/2014/main" id="{987E32FC-5E30-D3E4-3B6D-AA4D9A68F062}"/>
+              </a:ext>
+            </a:extLst>
+          </p:cNvPr>
+          <p:cNvSpPr/>
+          <p:nvPr/>
+        </p:nvSpPr>
+        <p:spPr>
+          <a:xfrm>
+            <a:off x="5546956" y="3781165"/>
+            <a:ext cx="1793535" cy="1517678"/>
+          </a:xfrm>
+          <a:prstGeom prst="rect">
+            <a:avLst/>
+          </a:prstGeom>
+          <a:solidFill>
+            <a:schemeClr val="bg1">
+              <a:lumMod val="95000"/>
+            </a:schemeClr>
+          </a:solidFill>
+          <a:ln>
+            <a:solidFill>
+              <a:srgbClr val="CE9178"/>
+            </a:solidFill>
+          </a:ln>
+        </p:spPr>
+        <p:style>
+          <a:lnRef idx="2">
+            <a:schemeClr val="accent1">
+              <a:shade val="50000"/>
+            </a:schemeClr>
+          </a:lnRef>
+          <a:fillRef idx="1">
+            <a:schemeClr val="accent1"/>
+          </a:fillRef>
+          <a:effectRef idx="0">
+            <a:schemeClr val="accent1"/>
+          </a:effectRef>
+          <a:fontRef idx="minor">
+            <a:schemeClr val="lt1"/>
+          </a:fontRef>
+        </p:style>
+        <p:txBody>
+          <a:bodyPr rtlCol="0" anchor="ctr"/>
+          <a:lstStyle/>
+          <a:p>
+            <a:pPr algn="ctr"/>
+            <a:endParaRPr lang="en-CA" dirty="0">
+              <a:ln>
+                <a:solidFill>
+                  <a:srgbClr val="3B3838"/>
+                </a:solidFill>
+              </a:ln>
+            </a:endParaRPr>
+          </a:p>
+        </p:txBody>
+      </p:sp>
+      <p:sp>
+        <p:nvSpPr>
+          <p:cNvPr id="40" name="TextBox 39">
+            <a:extLst>
+              <a:ext uri="{FF2B5EF4-FFF2-40B4-BE49-F238E27FC236}">
+                <a16:creationId xmlns:a16="http://schemas.microsoft.com/office/drawing/2014/main" id="{F48095C8-4C45-DB7E-B029-B69AC3FFFD5F}"/>
+              </a:ext>
+            </a:extLst>
+          </p:cNvPr>
+          <p:cNvSpPr txBox="1"/>
+          <p:nvPr/>
+        </p:nvSpPr>
+        <p:spPr>
+          <a:xfrm>
+            <a:off x="3594476" y="2918945"/>
+            <a:ext cx="529407" cy="276999"/>
+          </a:xfrm>
+          <a:prstGeom prst="rect">
+            <a:avLst/>
+          </a:prstGeom>
+          <a:solidFill>
+            <a:schemeClr val="bg1">
+              <a:lumMod val="95000"/>
+            </a:schemeClr>
+          </a:solidFill>
+          <a:ln>
+            <a:solidFill>
+              <a:srgbClr val="CE9178"/>
+            </a:solidFill>
+          </a:ln>
+        </p:spPr>
+        <p:txBody>
+          <a:bodyPr wrap="square" rtlCol="0">
+            <a:spAutoFit/>
+          </a:bodyPr>
+          <a:lstStyle/>
+          <a:p>
+            <a:r>
+              <a:rPr lang="en-CA" sz="1200" dirty="0"/>
+              <a:t>email</a:t>
+            </a:r>
+          </a:p>
+        </p:txBody>
+      </p:sp>
+      <p:grpSp>
+        <p:nvGrpSpPr>
+          <p:cNvPr id="41" name="Group 40">
+            <a:extLst>
+              <a:ext uri="{FF2B5EF4-FFF2-40B4-BE49-F238E27FC236}">
+                <a16:creationId xmlns:a16="http://schemas.microsoft.com/office/drawing/2014/main" id="{A114BBEF-961E-7B1C-34A1-25E0DECCC562}"/>
+              </a:ext>
+            </a:extLst>
+          </p:cNvPr>
+          <p:cNvGrpSpPr/>
+          <p:nvPr/>
+        </p:nvGrpSpPr>
+        <p:grpSpPr>
+          <a:xfrm>
+            <a:off x="3567835" y="3332960"/>
+            <a:ext cx="3772657" cy="369332"/>
+            <a:chOff x="3760546" y="2607504"/>
+            <a:chExt cx="3772657" cy="369332"/>
+          </a:xfrm>
+          <a:solidFill>
+            <a:schemeClr val="bg1">
+              <a:lumMod val="95000"/>
+            </a:schemeClr>
+          </a:solidFill>
+        </p:grpSpPr>
+        <p:sp>
+          <p:nvSpPr>
+            <p:cNvPr id="42" name="Rectangle 41">
+              <a:extLst>
+                <a:ext uri="{FF2B5EF4-FFF2-40B4-BE49-F238E27FC236}">
+                  <a16:creationId xmlns:a16="http://schemas.microsoft.com/office/drawing/2014/main" id="{B9100E83-E6D2-57A0-CA15-AC22E33CB8F3}"/>
+                </a:ext>
+              </a:extLst>
+            </p:cNvPr>
+            <p:cNvSpPr/>
+            <p:nvPr/>
+          </p:nvSpPr>
+          <p:spPr>
+            <a:xfrm>
+              <a:off x="3760546" y="2607504"/>
+              <a:ext cx="3772657" cy="369332"/>
+            </a:xfrm>
+            <a:prstGeom prst="rect">
+              <a:avLst/>
+            </a:prstGeom>
+            <a:grpFill/>
+            <a:ln>
+              <a:solidFill>
+                <a:srgbClr val="CE9178"/>
+              </a:solidFill>
+            </a:ln>
+          </p:spPr>
+          <p:style>
+            <a:lnRef idx="2">
+              <a:schemeClr val="accent1">
+                <a:shade val="50000"/>
+              </a:schemeClr>
+            </a:lnRef>
+            <a:fillRef idx="1">
+              <a:schemeClr val="accent1"/>
+            </a:fillRef>
+            <a:effectRef idx="0">
+              <a:schemeClr val="accent1"/>
+            </a:effectRef>
+            <a:fontRef idx="minor">
+              <a:schemeClr val="lt1"/>
+            </a:fontRef>
+          </p:style>
+          <p:txBody>
+            <a:bodyPr rtlCol="0" anchor="ctr"/>
+            <a:lstStyle/>
+            <a:p>
+              <a:pPr algn="ctr"/>
+              <a:endParaRPr lang="en-CA" dirty="0">
+                <a:ln>
+                  <a:solidFill>
+                    <a:srgbClr val="3B3838"/>
+                  </a:solidFill>
+                </a:ln>
+              </a:endParaRPr>
+            </a:p>
+          </p:txBody>
+        </p:sp>
+        <p:sp>
+          <p:nvSpPr>
+            <p:cNvPr id="43" name="TextBox 42">
+              <a:extLst>
+                <a:ext uri="{FF2B5EF4-FFF2-40B4-BE49-F238E27FC236}">
+                  <a16:creationId xmlns:a16="http://schemas.microsoft.com/office/drawing/2014/main" id="{24AB333A-ABCD-4177-CFB4-F9715F084A1A}"/>
+                </a:ext>
+              </a:extLst>
+            </p:cNvPr>
+            <p:cNvSpPr txBox="1"/>
+            <p:nvPr/>
+          </p:nvSpPr>
+          <p:spPr>
+            <a:xfrm>
+              <a:off x="3794508" y="2634095"/>
+              <a:ext cx="668324" cy="276999"/>
+            </a:xfrm>
+            <a:prstGeom prst="rect">
+              <a:avLst/>
+            </a:prstGeom>
+            <a:grpFill/>
+            <a:ln>
+              <a:solidFill>
+                <a:srgbClr val="CE9178"/>
+              </a:solidFill>
+            </a:ln>
+          </p:spPr>
+          <p:txBody>
+            <a:bodyPr wrap="none" rtlCol="0">
+              <a:spAutoFit/>
+            </a:bodyPr>
+            <a:lstStyle/>
+            <a:p>
+              <a:r>
+                <a:rPr lang="en-CA" sz="1200" dirty="0"/>
+                <a:t>address</a:t>
+              </a:r>
+            </a:p>
+          </p:txBody>
+        </p:sp>
+      </p:grpSp>
+      <p:sp>
+        <p:nvSpPr>
+          <p:cNvPr id="46" name="TextBox 45">
+            <a:extLst>
+              <a:ext uri="{FF2B5EF4-FFF2-40B4-BE49-F238E27FC236}">
+                <a16:creationId xmlns:a16="http://schemas.microsoft.com/office/drawing/2014/main" id="{DC52F282-14FF-7D73-286A-93B9809D044D}"/>
+              </a:ext>
+            </a:extLst>
+          </p:cNvPr>
+          <p:cNvSpPr txBox="1"/>
+          <p:nvPr/>
+        </p:nvSpPr>
+        <p:spPr>
+          <a:xfrm>
+            <a:off x="5224696" y="2918944"/>
+            <a:ext cx="913293" cy="276999"/>
+          </a:xfrm>
+          <a:prstGeom prst="rect">
+            <a:avLst/>
+          </a:prstGeom>
+          <a:solidFill>
+            <a:schemeClr val="bg1">
+              <a:lumMod val="95000"/>
+            </a:schemeClr>
+          </a:solidFill>
+          <a:ln>
+            <a:solidFill>
+              <a:srgbClr val="CE9178"/>
+            </a:solidFill>
+          </a:ln>
+        </p:spPr>
+        <p:txBody>
+          <a:bodyPr wrap="square" rtlCol="0">
+            <a:spAutoFit/>
+          </a:bodyPr>
+          <a:lstStyle/>
+          <a:p>
+            <a:r>
+              <a:rPr lang="en-CA" sz="1200" dirty="0"/>
+              <a:t>Postal Code</a:t>
+            </a:r>
+          </a:p>
+        </p:txBody>
+      </p:sp>
+      <p:sp>
+        <p:nvSpPr>
+          <p:cNvPr id="48" name="TextBox 47">
+            <a:extLst>
+              <a:ext uri="{FF2B5EF4-FFF2-40B4-BE49-F238E27FC236}">
+                <a16:creationId xmlns:a16="http://schemas.microsoft.com/office/drawing/2014/main" id="{EDD910EE-FFD0-9F80-7459-B447BB89523A}"/>
+              </a:ext>
+            </a:extLst>
+          </p:cNvPr>
+          <p:cNvSpPr txBox="1"/>
+          <p:nvPr/>
+        </p:nvSpPr>
+        <p:spPr>
+          <a:xfrm>
+            <a:off x="4322400" y="2924881"/>
+            <a:ext cx="727924" cy="276999"/>
+          </a:xfrm>
+          <a:prstGeom prst="rect">
+            <a:avLst/>
+          </a:prstGeom>
+          <a:solidFill>
+            <a:schemeClr val="bg1">
+              <a:lumMod val="95000"/>
+            </a:schemeClr>
+          </a:solidFill>
+          <a:ln>
+            <a:solidFill>
+              <a:srgbClr val="CE9178"/>
+            </a:solidFill>
+          </a:ln>
+        </p:spPr>
+        <p:txBody>
+          <a:bodyPr wrap="square" rtlCol="0">
+            <a:spAutoFit/>
+          </a:bodyPr>
+          <a:lstStyle/>
+          <a:p>
+            <a:r>
+              <a:rPr lang="en-CA" sz="1200" dirty="0"/>
+              <a:t>Phone #</a:t>
+            </a:r>
+          </a:p>
+        </p:txBody>
+      </p:sp>
+      <p:sp>
+        <p:nvSpPr>
+          <p:cNvPr id="49" name="TextBox 48">
+            <a:extLst>
+              <a:ext uri="{FF2B5EF4-FFF2-40B4-BE49-F238E27FC236}">
+                <a16:creationId xmlns:a16="http://schemas.microsoft.com/office/drawing/2014/main" id="{77CD258B-9E6B-29DD-F40C-BA330C681E49}"/>
+              </a:ext>
+            </a:extLst>
+          </p:cNvPr>
+          <p:cNvSpPr txBox="1"/>
+          <p:nvPr/>
+        </p:nvSpPr>
+        <p:spPr>
+          <a:xfrm>
+            <a:off x="5593956" y="3867809"/>
+            <a:ext cx="1551686" cy="738664"/>
+          </a:xfrm>
+          <a:prstGeom prst="rect">
+            <a:avLst/>
+          </a:prstGeom>
+          <a:solidFill>
+            <a:schemeClr val="bg1">
+              <a:lumMod val="95000"/>
+            </a:schemeClr>
+          </a:solidFill>
+          <a:ln>
+            <a:solidFill>
+              <a:srgbClr val="CE9178"/>
+            </a:solidFill>
+          </a:ln>
+        </p:spPr>
+        <p:txBody>
+          <a:bodyPr wrap="square" rtlCol="0">
+            <a:spAutoFit/>
+          </a:bodyPr>
+          <a:lstStyle/>
+          <a:p>
+            <a:r>
+              <a:rPr lang="en-CA" sz="1400" dirty="0"/>
+              <a:t>API #2 – Display</a:t>
+            </a:r>
+          </a:p>
+          <a:p>
+            <a:endParaRPr lang="en-CA" sz="1400" dirty="0"/>
+          </a:p>
+          <a:p>
+            <a:r>
+              <a:rPr lang="en-CA" sz="1400" dirty="0"/>
+              <a:t>MUST DECIDE?</a:t>
+            </a:r>
+          </a:p>
+        </p:txBody>
+      </p:sp>
+      <p:grpSp>
+        <p:nvGrpSpPr>
+          <p:cNvPr id="50" name="Group 49">
+            <a:extLst>
+              <a:ext uri="{FF2B5EF4-FFF2-40B4-BE49-F238E27FC236}">
+                <a16:creationId xmlns:a16="http://schemas.microsoft.com/office/drawing/2014/main" id="{674B4F7A-A5EC-0884-24AE-07F719E543A2}"/>
+              </a:ext>
+            </a:extLst>
+          </p:cNvPr>
+          <p:cNvGrpSpPr/>
+          <p:nvPr/>
+        </p:nvGrpSpPr>
+        <p:grpSpPr>
+          <a:xfrm>
+            <a:off x="1749872" y="2456244"/>
+            <a:ext cx="1343440" cy="520592"/>
+            <a:chOff x="1662271" y="2488864"/>
+            <a:chExt cx="1374627" cy="484451"/>
+          </a:xfrm>
+        </p:grpSpPr>
+        <p:sp>
+          <p:nvSpPr>
+            <p:cNvPr id="51" name="Rectangle: Rounded Corners 50">
+              <a:extLst>
+                <a:ext uri="{FF2B5EF4-FFF2-40B4-BE49-F238E27FC236}">
+                  <a16:creationId xmlns:a16="http://schemas.microsoft.com/office/drawing/2014/main" id="{642439C3-ECFF-36A4-6FE2-B608864E5FE9}"/>
+                </a:ext>
+              </a:extLst>
+            </p:cNvPr>
+            <p:cNvSpPr/>
+            <p:nvPr/>
+          </p:nvSpPr>
+          <p:spPr>
+            <a:xfrm>
+              <a:off x="1662271" y="2488864"/>
+              <a:ext cx="1374627" cy="484451"/>
+            </a:xfrm>
+            <a:prstGeom prst="roundRect">
+              <a:avLst/>
+            </a:prstGeom>
+            <a:noFill/>
+          </p:spPr>
+          <p:style>
+            <a:lnRef idx="2">
+              <a:schemeClr val="accent1">
+                <a:shade val="50000"/>
+              </a:schemeClr>
+            </a:lnRef>
+            <a:fillRef idx="1">
+              <a:schemeClr val="accent1"/>
+            </a:fillRef>
+            <a:effectRef idx="0">
+              <a:schemeClr val="accent1"/>
+            </a:effectRef>
+            <a:fontRef idx="minor">
+              <a:schemeClr val="lt1"/>
+            </a:fontRef>
+          </p:style>
+          <p:txBody>
+            <a:bodyPr rtlCol="0" anchor="ctr"/>
+            <a:lstStyle/>
+            <a:p>
+              <a:pPr algn="ctr"/>
+              <a:endParaRPr lang="en-CA"/>
+            </a:p>
+          </p:txBody>
+        </p:sp>
+        <p:sp>
+          <p:nvSpPr>
+            <p:cNvPr id="52" name="TextBox 51">
+              <a:extLst>
+                <a:ext uri="{FF2B5EF4-FFF2-40B4-BE49-F238E27FC236}">
+                  <a16:creationId xmlns:a16="http://schemas.microsoft.com/office/drawing/2014/main" id="{18D7A19C-9A8B-7447-7FB8-E9EDF131CD82}"/>
+                </a:ext>
+              </a:extLst>
+            </p:cNvPr>
+            <p:cNvSpPr txBox="1"/>
+            <p:nvPr/>
+          </p:nvSpPr>
+          <p:spPr>
+            <a:xfrm>
+              <a:off x="1795503" y="2515645"/>
+              <a:ext cx="997389" cy="430887"/>
+            </a:xfrm>
+            <a:prstGeom prst="rect">
+              <a:avLst/>
+            </a:prstGeom>
+            <a:noFill/>
+          </p:spPr>
+          <p:txBody>
+            <a:bodyPr wrap="none" rtlCol="0">
+              <a:spAutoFit/>
+            </a:bodyPr>
+            <a:lstStyle/>
+            <a:p>
+              <a:pPr algn="ctr"/>
+              <a:r>
+                <a:rPr lang="en-CA" sz="1100" dirty="0"/>
+                <a:t>Show me all </a:t>
+              </a:r>
+            </a:p>
+            <a:p>
+              <a:pPr algn="ctr"/>
+              <a:r>
+                <a:rPr lang="en-CA" sz="1100" dirty="0"/>
+                <a:t>Appointments</a:t>
+              </a:r>
+            </a:p>
+          </p:txBody>
+        </p:sp>
+      </p:grpSp>
+      <p:grpSp>
+        <p:nvGrpSpPr>
+          <p:cNvPr id="53" name="Group 52">
+            <a:extLst>
+              <a:ext uri="{FF2B5EF4-FFF2-40B4-BE49-F238E27FC236}">
+                <a16:creationId xmlns:a16="http://schemas.microsoft.com/office/drawing/2014/main" id="{0B0DC4A5-4352-6CC5-31F0-0EA8D0261C1F}"/>
+              </a:ext>
+            </a:extLst>
+          </p:cNvPr>
+          <p:cNvGrpSpPr/>
+          <p:nvPr/>
+        </p:nvGrpSpPr>
+        <p:grpSpPr>
+          <a:xfrm>
+            <a:off x="1710062" y="3428999"/>
+            <a:ext cx="1372253" cy="484037"/>
+            <a:chOff x="6008194" y="4774859"/>
+            <a:chExt cx="1374627" cy="497998"/>
+          </a:xfrm>
+        </p:grpSpPr>
+        <p:sp>
+          <p:nvSpPr>
+            <p:cNvPr id="54" name="Rectangle: Rounded Corners 53">
+              <a:extLst>
+                <a:ext uri="{FF2B5EF4-FFF2-40B4-BE49-F238E27FC236}">
+                  <a16:creationId xmlns:a16="http://schemas.microsoft.com/office/drawing/2014/main" id="{F718948F-0622-3A93-A0FC-9D8E7E89BF4D}"/>
+                </a:ext>
+              </a:extLst>
+            </p:cNvPr>
+            <p:cNvSpPr/>
+            <p:nvPr/>
+          </p:nvSpPr>
+          <p:spPr>
+            <a:xfrm>
+              <a:off x="6008194" y="4774859"/>
+              <a:ext cx="1374627" cy="484451"/>
+            </a:xfrm>
+            <a:prstGeom prst="roundRect">
+              <a:avLst/>
+            </a:prstGeom>
+            <a:noFill/>
+          </p:spPr>
+          <p:style>
+            <a:lnRef idx="2">
+              <a:schemeClr val="accent1">
+                <a:shade val="50000"/>
+              </a:schemeClr>
+            </a:lnRef>
+            <a:fillRef idx="1">
+              <a:schemeClr val="accent1"/>
+            </a:fillRef>
+            <a:effectRef idx="0">
+              <a:schemeClr val="accent1"/>
+            </a:effectRef>
+            <a:fontRef idx="minor">
+              <a:schemeClr val="lt1"/>
+            </a:fontRef>
+          </p:style>
+          <p:txBody>
+            <a:bodyPr rtlCol="0" anchor="ctr"/>
+            <a:lstStyle/>
+            <a:p>
+              <a:pPr algn="ctr"/>
+              <a:endParaRPr lang="en-CA"/>
+            </a:p>
+          </p:txBody>
+        </p:sp>
+        <p:sp>
+          <p:nvSpPr>
+            <p:cNvPr id="55" name="TextBox 54">
+              <a:extLst>
+                <a:ext uri="{FF2B5EF4-FFF2-40B4-BE49-F238E27FC236}">
+                  <a16:creationId xmlns:a16="http://schemas.microsoft.com/office/drawing/2014/main" id="{52E9C72F-A9FB-804E-A9F2-0758EA5DB0BA}"/>
+                </a:ext>
+              </a:extLst>
+            </p:cNvPr>
+            <p:cNvSpPr txBox="1"/>
+            <p:nvPr/>
+          </p:nvSpPr>
+          <p:spPr>
+            <a:xfrm>
+              <a:off x="6048073" y="4811192"/>
+              <a:ext cx="1333634" cy="461665"/>
+            </a:xfrm>
+            <a:prstGeom prst="rect">
+              <a:avLst/>
+            </a:prstGeom>
+            <a:noFill/>
+          </p:spPr>
+          <p:txBody>
+            <a:bodyPr wrap="none" rtlCol="0">
+              <a:spAutoFit/>
+            </a:bodyPr>
+            <a:lstStyle/>
+            <a:p>
+              <a:pPr algn="ctr"/>
+              <a:r>
+                <a:rPr lang="en-CA" sz="1200" dirty="0"/>
+                <a:t>Add </a:t>
+              </a:r>
+            </a:p>
+            <a:p>
+              <a:pPr algn="ctr"/>
+              <a:r>
+                <a:rPr lang="en-CA" sz="1200" dirty="0"/>
+                <a:t>New Appointment</a:t>
+              </a:r>
+            </a:p>
+          </p:txBody>
+        </p:sp>
+      </p:grpSp>
+      <p:sp>
+        <p:nvSpPr>
+          <p:cNvPr id="56" name="TextBox 55">
+            <a:extLst>
+              <a:ext uri="{FF2B5EF4-FFF2-40B4-BE49-F238E27FC236}">
+                <a16:creationId xmlns:a16="http://schemas.microsoft.com/office/drawing/2014/main" id="{519B9C63-7348-5C42-8C27-6BAA7C28503E}"/>
+              </a:ext>
+            </a:extLst>
+          </p:cNvPr>
+          <p:cNvSpPr txBox="1"/>
+          <p:nvPr/>
+        </p:nvSpPr>
+        <p:spPr>
+          <a:xfrm>
+            <a:off x="1413334" y="3028262"/>
+            <a:ext cx="1872500" cy="338554"/>
+          </a:xfrm>
+          <a:prstGeom prst="rect">
+            <a:avLst/>
+          </a:prstGeom>
+          <a:noFill/>
+        </p:spPr>
+        <p:txBody>
+          <a:bodyPr wrap="none" rtlCol="0">
+            <a:spAutoFit/>
+          </a:bodyPr>
+          <a:lstStyle/>
+          <a:p>
+            <a:r>
+              <a:rPr lang="en-CA" sz="1600" dirty="0"/>
+              <a:t>User input/interface</a:t>
+            </a:r>
+          </a:p>
+        </p:txBody>
+      </p:sp>
+      <p:grpSp>
+        <p:nvGrpSpPr>
+          <p:cNvPr id="57" name="Group 56">
+            <a:extLst>
+              <a:ext uri="{FF2B5EF4-FFF2-40B4-BE49-F238E27FC236}">
+                <a16:creationId xmlns:a16="http://schemas.microsoft.com/office/drawing/2014/main" id="{DAD60792-1B54-C681-9EDD-D884978A43F1}"/>
+              </a:ext>
+            </a:extLst>
+          </p:cNvPr>
+          <p:cNvGrpSpPr/>
+          <p:nvPr/>
+        </p:nvGrpSpPr>
+        <p:grpSpPr>
+          <a:xfrm>
+            <a:off x="4270121" y="1778702"/>
+            <a:ext cx="1104035" cy="339256"/>
+            <a:chOff x="6008194" y="4774859"/>
+            <a:chExt cx="1374627" cy="484451"/>
+          </a:xfrm>
+        </p:grpSpPr>
+        <p:sp>
+          <p:nvSpPr>
+            <p:cNvPr id="58" name="Rectangle: Rounded Corners 57">
+              <a:extLst>
+                <a:ext uri="{FF2B5EF4-FFF2-40B4-BE49-F238E27FC236}">
+                  <a16:creationId xmlns:a16="http://schemas.microsoft.com/office/drawing/2014/main" id="{7FA673EE-84ED-19CC-9D10-1FCA154B6903}"/>
+                </a:ext>
+              </a:extLst>
+            </p:cNvPr>
+            <p:cNvSpPr/>
+            <p:nvPr/>
+          </p:nvSpPr>
+          <p:spPr>
+            <a:xfrm>
+              <a:off x="6008194" y="4774859"/>
+              <a:ext cx="1374627" cy="484451"/>
+            </a:xfrm>
+            <a:prstGeom prst="roundRect">
+              <a:avLst/>
+            </a:prstGeom>
+            <a:noFill/>
+          </p:spPr>
+          <p:style>
+            <a:lnRef idx="2">
+              <a:schemeClr val="accent1">
+                <a:shade val="50000"/>
+              </a:schemeClr>
+            </a:lnRef>
+            <a:fillRef idx="1">
+              <a:schemeClr val="accent1"/>
+            </a:fillRef>
+            <a:effectRef idx="0">
+              <a:schemeClr val="accent1"/>
+            </a:effectRef>
+            <a:fontRef idx="minor">
+              <a:schemeClr val="lt1"/>
+            </a:fontRef>
+          </p:style>
+          <p:txBody>
+            <a:bodyPr rtlCol="0" anchor="ctr"/>
+            <a:lstStyle/>
+            <a:p>
+              <a:pPr algn="ctr"/>
+              <a:endParaRPr lang="en-CA"/>
+            </a:p>
+          </p:txBody>
+        </p:sp>
+        <p:sp>
+          <p:nvSpPr>
+            <p:cNvPr id="59" name="TextBox 58">
+              <a:extLst>
+                <a:ext uri="{FF2B5EF4-FFF2-40B4-BE49-F238E27FC236}">
+                  <a16:creationId xmlns:a16="http://schemas.microsoft.com/office/drawing/2014/main" id="{7C96A33B-5113-3D32-7AE4-8D1E183B0E1F}"/>
+                </a:ext>
+              </a:extLst>
+            </p:cNvPr>
+            <p:cNvSpPr txBox="1"/>
+            <p:nvPr/>
+          </p:nvSpPr>
+          <p:spPr>
+            <a:xfrm>
+              <a:off x="6382973" y="4811193"/>
+              <a:ext cx="663833" cy="395549"/>
+            </a:xfrm>
+            <a:prstGeom prst="rect">
+              <a:avLst/>
+            </a:prstGeom>
+            <a:noFill/>
+          </p:spPr>
+          <p:txBody>
+            <a:bodyPr wrap="none" rtlCol="0">
+              <a:spAutoFit/>
+            </a:bodyPr>
+            <a:lstStyle/>
+            <a:p>
+              <a:pPr algn="ctr"/>
+              <a:r>
+                <a:rPr lang="en-CA" sz="1200" dirty="0"/>
+                <a:t>PREV.</a:t>
+              </a:r>
+            </a:p>
+          </p:txBody>
+        </p:sp>
+      </p:grpSp>
+    </p:spTree>
+    <p:extLst>
+      <p:ext uri="{BB962C8B-B14F-4D97-AF65-F5344CB8AC3E}">
+        <p14:creationId xmlns:p14="http://schemas.microsoft.com/office/powerpoint/2010/main" val="4009984513"/>
+      </p:ext>
+    </p:extLst>
+  </p:cSld>
+  <p:clrMapOvr>
+    <a:masterClrMapping/>
+  </p:clrMapOvr>
+</p:sld>
+</file>
+
 <file path=ppt/slides/slide2.xml><?xml version="1.0" encoding="utf-8"?>
 <p:sld xmlns:a="http://schemas.openxmlformats.org/drawingml/2006/main" xmlns:r="http://schemas.openxmlformats.org/officeDocument/2006/relationships" xmlns:p="http://schemas.openxmlformats.org/presentationml/2006/main">
   <p:cSld>
@@ -9294,7 +12311,7 @@
                 </a:solidFill>
                 <a:latin typeface="Consolas" panose="020B0609020204030204" pitchFamily="49" charset="0"/>
               </a:rPr>
-              <a:t>THEN the project information is saved [local storage or other servers such as google drive]</a:t>
+              <a:t>THEN the project information is saved [local storage]</a:t>
             </a:r>
           </a:p>
           <a:p>
@@ -9308,21 +12325,7 @@
                 </a:solidFill>
                 <a:latin typeface="Consolas" panose="020B0609020204030204" pitchFamily="49" charset="0"/>
               </a:rPr>
-              <a:t>WHEN I open my portfolio dashboard, I see the list of all my project, </a:t>
-            </a:r>
-          </a:p>
-          <a:p>
-            <a:pPr marL="0" indent="0">
-              <a:buNone/>
-            </a:pPr>
-            <a:r>
-              <a:rPr lang="en-US" sz="2600" dirty="0">
-                <a:solidFill>
-                  <a:schemeClr val="bg1"/>
-                </a:solidFill>
-                <a:latin typeface="Consolas" panose="020B0609020204030204" pitchFamily="49" charset="0"/>
-              </a:rPr>
-              <a:t>[perhaps in a calendar format] in the order of [a. time and date / or b. priority]</a:t>
+              <a:t>WHEN I click “SHOW ME”, I see the list of all my project, in the order of [time and date]</a:t>
             </a:r>
           </a:p>
           <a:p>
@@ -9802,6 +12805,298 @@
 </file>
 
 <file path=ppt/slides/slide7.xml><?xml version="1.0" encoding="utf-8"?>
+<p:sld xmlns:a="http://schemas.openxmlformats.org/drawingml/2006/main" xmlns:r="http://schemas.openxmlformats.org/officeDocument/2006/relationships" xmlns:p="http://schemas.openxmlformats.org/presentationml/2006/main">
+  <p:cSld>
+    <p:bg>
+      <p:bgPr>
+        <a:solidFill>
+          <a:srgbClr val="3B3838"/>
+        </a:solidFill>
+        <a:effectLst/>
+      </p:bgPr>
+    </p:bg>
+    <p:spTree>
+      <p:nvGrpSpPr>
+        <p:cNvPr id="1" name=""/>
+        <p:cNvGrpSpPr/>
+        <p:nvPr/>
+      </p:nvGrpSpPr>
+      <p:grpSpPr>
+        <a:xfrm>
+          <a:off x="0" y="0"/>
+          <a:ext cx="0" cy="0"/>
+          <a:chOff x="0" y="0"/>
+          <a:chExt cx="0" cy="0"/>
+        </a:xfrm>
+      </p:grpSpPr>
+      <p:sp>
+        <p:nvSpPr>
+          <p:cNvPr id="3" name="Content Placeholder 2">
+            <a:extLst>
+              <a:ext uri="{FF2B5EF4-FFF2-40B4-BE49-F238E27FC236}">
+                <a16:creationId xmlns:a16="http://schemas.microsoft.com/office/drawing/2014/main" id="{2FE1FCEA-43C2-5998-45DC-D7DA755A2140}"/>
+              </a:ext>
+            </a:extLst>
+          </p:cNvPr>
+          <p:cNvSpPr>
+            <a:spLocks noGrp="1"/>
+          </p:cNvSpPr>
+          <p:nvPr>
+            <p:ph idx="1"/>
+          </p:nvPr>
+        </p:nvSpPr>
+        <p:spPr>
+          <a:xfrm>
+            <a:off x="574158" y="737191"/>
+            <a:ext cx="11157098" cy="5571458"/>
+          </a:xfrm>
+        </p:spPr>
+        <p:txBody>
+          <a:bodyPr>
+            <a:normAutofit lnSpcReduction="10000"/>
+          </a:bodyPr>
+          <a:lstStyle/>
+          <a:p>
+            <a:pPr marL="177800" indent="0">
+              <a:buNone/>
+            </a:pPr>
+            <a:r>
+              <a:rPr lang="en-US" sz="2600" b="0" dirty="0">
+                <a:solidFill>
+                  <a:schemeClr val="bg1"/>
+                </a:solidFill>
+                <a:effectLst/>
+                <a:latin typeface="Consolas" panose="020B0609020204030204" pitchFamily="49" charset="0"/>
+              </a:rPr>
+              <a:t>Issue List:</a:t>
+            </a:r>
+          </a:p>
+          <a:p>
+            <a:pPr marL="635000" indent="-457200">
+              <a:buFontTx/>
+              <a:buChar char="-"/>
+            </a:pPr>
+            <a:r>
+              <a:rPr lang="en-US" sz="2600" dirty="0">
+                <a:solidFill>
+                  <a:schemeClr val="bg1"/>
+                </a:solidFill>
+                <a:latin typeface="Consolas" panose="020B0609020204030204" pitchFamily="49" charset="0"/>
+              </a:rPr>
+              <a:t>Styling and CSS Framework</a:t>
+            </a:r>
+          </a:p>
+          <a:p>
+            <a:pPr marL="1092200" lvl="1" indent="-457200">
+              <a:buFontTx/>
+              <a:buChar char="-"/>
+            </a:pPr>
+            <a:r>
+              <a:rPr lang="en-US" sz="2200" dirty="0">
+                <a:solidFill>
+                  <a:schemeClr val="bg1"/>
+                </a:solidFill>
+                <a:latin typeface="Consolas" panose="020B0609020204030204" pitchFamily="49" charset="0"/>
+              </a:rPr>
+              <a:t>Choose CSS Framework</a:t>
+            </a:r>
+          </a:p>
+          <a:p>
+            <a:pPr marL="1549400" lvl="2" indent="-457200">
+              <a:buFontTx/>
+              <a:buChar char="-"/>
+            </a:pPr>
+            <a:r>
+              <a:rPr lang="en-US" sz="1800" dirty="0">
+                <a:solidFill>
+                  <a:schemeClr val="bg1"/>
+                </a:solidFill>
+                <a:latin typeface="Consolas" panose="020B0609020204030204" pitchFamily="49" charset="0"/>
+                <a:hlinkClick r:id="rId2"/>
+              </a:rPr>
+              <a:t>https://tailwindcss.com/</a:t>
+            </a:r>
+            <a:endParaRPr lang="en-US" sz="1800" dirty="0">
+              <a:solidFill>
+                <a:schemeClr val="bg1"/>
+              </a:solidFill>
+              <a:latin typeface="Consolas" panose="020B0609020204030204" pitchFamily="49" charset="0"/>
+            </a:endParaRPr>
+          </a:p>
+          <a:p>
+            <a:pPr marL="1549400" lvl="2" indent="-457200">
+              <a:buFontTx/>
+              <a:buChar char="-"/>
+            </a:pPr>
+            <a:r>
+              <a:rPr lang="en-US" sz="1800" dirty="0">
+                <a:solidFill>
+                  <a:schemeClr val="bg1"/>
+                </a:solidFill>
+                <a:latin typeface="Consolas" panose="020B0609020204030204" pitchFamily="49" charset="0"/>
+                <a:hlinkClick r:id="rId3"/>
+              </a:rPr>
+              <a:t>https://bulma.io/</a:t>
+            </a:r>
+            <a:endParaRPr lang="en-US" sz="1800" dirty="0">
+              <a:solidFill>
+                <a:schemeClr val="bg1"/>
+              </a:solidFill>
+              <a:latin typeface="Consolas" panose="020B0609020204030204" pitchFamily="49" charset="0"/>
+            </a:endParaRPr>
+          </a:p>
+          <a:p>
+            <a:pPr marL="635000" indent="-457200">
+              <a:buFontTx/>
+              <a:buChar char="-"/>
+            </a:pPr>
+            <a:r>
+              <a:rPr lang="en-US" sz="2600" dirty="0">
+                <a:solidFill>
+                  <a:schemeClr val="bg1"/>
+                </a:solidFill>
+                <a:latin typeface="Consolas" panose="020B0609020204030204" pitchFamily="49" charset="0"/>
+              </a:rPr>
+              <a:t>Refine the wireframe and make a plan</a:t>
+            </a:r>
+          </a:p>
+          <a:p>
+            <a:pPr marL="1092200" lvl="1" indent="-457200">
+              <a:buFontTx/>
+              <a:buChar char="-"/>
+            </a:pPr>
+            <a:r>
+              <a:rPr lang="en-US" sz="2400" dirty="0">
+                <a:solidFill>
+                  <a:schemeClr val="bg1"/>
+                </a:solidFill>
+                <a:latin typeface="Consolas" panose="020B0609020204030204" pitchFamily="49" charset="0"/>
+              </a:rPr>
+              <a:t>New Project Button</a:t>
+            </a:r>
+          </a:p>
+          <a:p>
+            <a:pPr marL="1092200" lvl="1" indent="-457200">
+              <a:buFontTx/>
+              <a:buChar char="-"/>
+            </a:pPr>
+            <a:r>
+              <a:rPr lang="en-US" sz="2200" dirty="0">
+                <a:solidFill>
+                  <a:schemeClr val="bg1"/>
+                </a:solidFill>
+                <a:latin typeface="Consolas" panose="020B0609020204030204" pitchFamily="49" charset="0"/>
+              </a:rPr>
+              <a:t>Calendar</a:t>
+            </a:r>
+          </a:p>
+          <a:p>
+            <a:pPr marL="1092200" lvl="1" indent="-457200">
+              <a:buFontTx/>
+              <a:buChar char="-"/>
+            </a:pPr>
+            <a:endParaRPr lang="en-US" sz="2200" dirty="0">
+              <a:solidFill>
+                <a:schemeClr val="bg1"/>
+              </a:solidFill>
+              <a:latin typeface="Consolas" panose="020B0609020204030204" pitchFamily="49" charset="0"/>
+            </a:endParaRPr>
+          </a:p>
+          <a:p>
+            <a:pPr marL="635000" indent="-457200">
+              <a:buFontTx/>
+              <a:buChar char="-"/>
+            </a:pPr>
+            <a:r>
+              <a:rPr lang="en-US" sz="2200" dirty="0">
+                <a:solidFill>
+                  <a:schemeClr val="bg1"/>
+                </a:solidFill>
+                <a:latin typeface="Consolas" panose="020B0609020204030204" pitchFamily="49" charset="0"/>
+              </a:rPr>
+              <a:t>Pseudo Code as team</a:t>
+            </a:r>
+          </a:p>
+          <a:p>
+            <a:pPr marL="635000" indent="-457200">
+              <a:buFontTx/>
+              <a:buChar char="-"/>
+            </a:pPr>
+            <a:r>
+              <a:rPr lang="en-US" sz="2600" dirty="0">
+                <a:solidFill>
+                  <a:schemeClr val="bg1"/>
+                </a:solidFill>
+                <a:latin typeface="Consolas" panose="020B0609020204030204" pitchFamily="49" charset="0"/>
+              </a:rPr>
+              <a:t>Divide up who does what</a:t>
+            </a:r>
+          </a:p>
+          <a:p>
+            <a:pPr marL="0" indent="0">
+              <a:buNone/>
+            </a:pPr>
+            <a:endParaRPr lang="en-US" sz="2600" dirty="0">
+              <a:solidFill>
+                <a:schemeClr val="bg1"/>
+              </a:solidFill>
+              <a:latin typeface="Consolas" panose="020B0609020204030204" pitchFamily="49" charset="0"/>
+            </a:endParaRPr>
+          </a:p>
+          <a:p>
+            <a:pPr marL="177800" indent="0">
+              <a:buNone/>
+            </a:pPr>
+            <a:endParaRPr lang="en-US" sz="2600" b="0" dirty="0">
+              <a:solidFill>
+                <a:schemeClr val="bg1"/>
+              </a:solidFill>
+              <a:effectLst/>
+              <a:latin typeface="Consolas" panose="020B0609020204030204" pitchFamily="49" charset="0"/>
+            </a:endParaRPr>
+          </a:p>
+          <a:p>
+            <a:pPr marL="177800" indent="0">
+              <a:buNone/>
+            </a:pPr>
+            <a:r>
+              <a:rPr lang="en-US" sz="2600" dirty="0">
+                <a:solidFill>
+                  <a:schemeClr val="bg1"/>
+                </a:solidFill>
+                <a:latin typeface="Consolas" panose="020B0609020204030204" pitchFamily="49" charset="0"/>
+              </a:rPr>
+              <a:t> </a:t>
+            </a:r>
+          </a:p>
+          <a:p>
+            <a:pPr marL="177800" indent="0">
+              <a:buNone/>
+            </a:pPr>
+            <a:endParaRPr lang="en-US" sz="2600" b="0" dirty="0">
+              <a:solidFill>
+                <a:schemeClr val="bg1"/>
+              </a:solidFill>
+              <a:effectLst/>
+              <a:latin typeface="Consolas" panose="020B0609020204030204" pitchFamily="49" charset="0"/>
+            </a:endParaRPr>
+          </a:p>
+        </p:txBody>
+      </p:sp>
+    </p:spTree>
+    <p:extLst>
+      <p:ext uri="{BB962C8B-B14F-4D97-AF65-F5344CB8AC3E}">
+        <p14:creationId xmlns:p14="http://schemas.microsoft.com/office/powerpoint/2010/main" val="1824860605"/>
+      </p:ext>
+    </p:extLst>
+  </p:cSld>
+  <p:clrMapOvr>
+    <a:masterClrMapping/>
+  </p:clrMapOvr>
+</p:sld>
+</file>
+
+<file path=ppt/slides/slide8.xml><?xml version="1.0" encoding="utf-8"?>
 <p:sld xmlns:a="http://schemas.openxmlformats.org/drawingml/2006/main" xmlns:r="http://schemas.openxmlformats.org/officeDocument/2006/relationships" xmlns:p="http://schemas.openxmlformats.org/presentationml/2006/main">
   <p:cSld>
     <p:spTree>
@@ -10456,6 +13751,1381 @@
     <p:extLst>
       <p:ext uri="{BB962C8B-B14F-4D97-AF65-F5344CB8AC3E}">
         <p14:creationId xmlns:p14="http://schemas.microsoft.com/office/powerpoint/2010/main" val="2567175776"/>
+      </p:ext>
+    </p:extLst>
+  </p:cSld>
+  <p:clrMapOvr>
+    <a:masterClrMapping/>
+  </p:clrMapOvr>
+</p:sld>
+</file>
+
+<file path=ppt/slides/slide9.xml><?xml version="1.0" encoding="utf-8"?>
+<p:sld xmlns:a="http://schemas.openxmlformats.org/drawingml/2006/main" xmlns:r="http://schemas.openxmlformats.org/officeDocument/2006/relationships" xmlns:p="http://schemas.openxmlformats.org/presentationml/2006/main">
+  <p:cSld>
+    <p:spTree>
+      <p:nvGrpSpPr>
+        <p:cNvPr id="1" name=""/>
+        <p:cNvGrpSpPr/>
+        <p:nvPr/>
+      </p:nvGrpSpPr>
+      <p:grpSpPr>
+        <a:xfrm>
+          <a:off x="0" y="0"/>
+          <a:ext cx="0" cy="0"/>
+          <a:chOff x="0" y="0"/>
+          <a:chExt cx="0" cy="0"/>
+        </a:xfrm>
+      </p:grpSpPr>
+      <p:sp>
+        <p:nvSpPr>
+          <p:cNvPr id="4" name="Rectangle 3">
+            <a:extLst>
+              <a:ext uri="{FF2B5EF4-FFF2-40B4-BE49-F238E27FC236}">
+                <a16:creationId xmlns:a16="http://schemas.microsoft.com/office/drawing/2014/main" id="{B795878D-4133-CFAC-832E-3F2359F2F836}"/>
+              </a:ext>
+            </a:extLst>
+          </p:cNvPr>
+          <p:cNvSpPr/>
+          <p:nvPr/>
+        </p:nvSpPr>
+        <p:spPr>
+          <a:xfrm>
+            <a:off x="1186903" y="823566"/>
+            <a:ext cx="6576414" cy="5413732"/>
+          </a:xfrm>
+          <a:prstGeom prst="rect">
+            <a:avLst/>
+          </a:prstGeom>
+          <a:noFill/>
+          <a:ln>
+            <a:solidFill>
+              <a:srgbClr val="3B3838"/>
+            </a:solidFill>
+          </a:ln>
+        </p:spPr>
+        <p:style>
+          <a:lnRef idx="2">
+            <a:schemeClr val="accent1">
+              <a:shade val="50000"/>
+            </a:schemeClr>
+          </a:lnRef>
+          <a:fillRef idx="1">
+            <a:schemeClr val="accent1"/>
+          </a:fillRef>
+          <a:effectRef idx="0">
+            <a:schemeClr val="accent1"/>
+          </a:effectRef>
+          <a:fontRef idx="minor">
+            <a:schemeClr val="lt1"/>
+          </a:fontRef>
+        </p:style>
+        <p:txBody>
+          <a:bodyPr rtlCol="0" anchor="ctr"/>
+          <a:lstStyle/>
+          <a:p>
+            <a:pPr algn="ctr"/>
+            <a:endParaRPr lang="en-CA"/>
+          </a:p>
+        </p:txBody>
+      </p:sp>
+      <p:sp>
+        <p:nvSpPr>
+          <p:cNvPr id="5" name="Rectangle 4">
+            <a:extLst>
+              <a:ext uri="{FF2B5EF4-FFF2-40B4-BE49-F238E27FC236}">
+                <a16:creationId xmlns:a16="http://schemas.microsoft.com/office/drawing/2014/main" id="{75A1C56A-A625-E469-A2E0-7CEE76EB6F87}"/>
+              </a:ext>
+            </a:extLst>
+          </p:cNvPr>
+          <p:cNvSpPr/>
+          <p:nvPr/>
+        </p:nvSpPr>
+        <p:spPr>
+          <a:xfrm>
+            <a:off x="1259571" y="896233"/>
+            <a:ext cx="6418967" cy="1314072"/>
+          </a:xfrm>
+          <a:prstGeom prst="rect">
+            <a:avLst/>
+          </a:prstGeom>
+          <a:noFill/>
+          <a:ln>
+            <a:solidFill>
+              <a:srgbClr val="CE9178"/>
+            </a:solidFill>
+          </a:ln>
+        </p:spPr>
+        <p:style>
+          <a:lnRef idx="2">
+            <a:schemeClr val="accent1">
+              <a:shade val="50000"/>
+            </a:schemeClr>
+          </a:lnRef>
+          <a:fillRef idx="1">
+            <a:schemeClr val="accent1"/>
+          </a:fillRef>
+          <a:effectRef idx="0">
+            <a:schemeClr val="accent1"/>
+          </a:effectRef>
+          <a:fontRef idx="minor">
+            <a:schemeClr val="lt1"/>
+          </a:fontRef>
+        </p:style>
+        <p:txBody>
+          <a:bodyPr rtlCol="0" anchor="ctr"/>
+          <a:lstStyle/>
+          <a:p>
+            <a:pPr algn="ctr"/>
+            <a:endParaRPr lang="en-CA"/>
+          </a:p>
+        </p:txBody>
+      </p:sp>
+      <p:cxnSp>
+        <p:nvCxnSpPr>
+          <p:cNvPr id="8" name="Straight Connector 7">
+            <a:extLst>
+              <a:ext uri="{FF2B5EF4-FFF2-40B4-BE49-F238E27FC236}">
+                <a16:creationId xmlns:a16="http://schemas.microsoft.com/office/drawing/2014/main" id="{34B0335A-7E65-4D8E-05FC-8A4EB2805A26}"/>
+              </a:ext>
+            </a:extLst>
+          </p:cNvPr>
+          <p:cNvCxnSpPr/>
+          <p:nvPr/>
+        </p:nvCxnSpPr>
+        <p:spPr>
+          <a:xfrm>
+            <a:off x="7145642" y="1968079"/>
+            <a:ext cx="387561" cy="0"/>
+          </a:xfrm>
+          <a:prstGeom prst="line">
+            <a:avLst/>
+          </a:prstGeom>
+        </p:spPr>
+        <p:style>
+          <a:lnRef idx="1">
+            <a:schemeClr val="accent1"/>
+          </a:lnRef>
+          <a:fillRef idx="0">
+            <a:schemeClr val="accent1"/>
+          </a:fillRef>
+          <a:effectRef idx="0">
+            <a:schemeClr val="accent1"/>
+          </a:effectRef>
+          <a:fontRef idx="minor">
+            <a:schemeClr val="tx1"/>
+          </a:fontRef>
+        </p:style>
+      </p:cxnSp>
+      <p:cxnSp>
+        <p:nvCxnSpPr>
+          <p:cNvPr id="9" name="Straight Connector 8">
+            <a:extLst>
+              <a:ext uri="{FF2B5EF4-FFF2-40B4-BE49-F238E27FC236}">
+                <a16:creationId xmlns:a16="http://schemas.microsoft.com/office/drawing/2014/main" id="{A55971C4-0F6D-3DD5-F248-FBC8A28B560D}"/>
+              </a:ext>
+            </a:extLst>
+          </p:cNvPr>
+          <p:cNvCxnSpPr/>
+          <p:nvPr/>
+        </p:nvCxnSpPr>
+        <p:spPr>
+          <a:xfrm>
+            <a:off x="7145642" y="2120479"/>
+            <a:ext cx="387561" cy="0"/>
+          </a:xfrm>
+          <a:prstGeom prst="line">
+            <a:avLst/>
+          </a:prstGeom>
+        </p:spPr>
+        <p:style>
+          <a:lnRef idx="1">
+            <a:schemeClr val="accent1"/>
+          </a:lnRef>
+          <a:fillRef idx="0">
+            <a:schemeClr val="accent1"/>
+          </a:fillRef>
+          <a:effectRef idx="0">
+            <a:schemeClr val="accent1"/>
+          </a:effectRef>
+          <a:fontRef idx="minor">
+            <a:schemeClr val="tx1"/>
+          </a:fontRef>
+        </p:style>
+      </p:cxnSp>
+      <p:cxnSp>
+        <p:nvCxnSpPr>
+          <p:cNvPr id="10" name="Straight Connector 9">
+            <a:extLst>
+              <a:ext uri="{FF2B5EF4-FFF2-40B4-BE49-F238E27FC236}">
+                <a16:creationId xmlns:a16="http://schemas.microsoft.com/office/drawing/2014/main" id="{A1815CA1-36F9-315C-8173-8E00AD441B48}"/>
+              </a:ext>
+            </a:extLst>
+          </p:cNvPr>
+          <p:cNvCxnSpPr/>
+          <p:nvPr/>
+        </p:nvCxnSpPr>
+        <p:spPr>
+          <a:xfrm>
+            <a:off x="7145642" y="2024598"/>
+            <a:ext cx="387561" cy="0"/>
+          </a:xfrm>
+          <a:prstGeom prst="line">
+            <a:avLst/>
+          </a:prstGeom>
+        </p:spPr>
+        <p:style>
+          <a:lnRef idx="1">
+            <a:schemeClr val="accent1"/>
+          </a:lnRef>
+          <a:fillRef idx="0">
+            <a:schemeClr val="accent1"/>
+          </a:fillRef>
+          <a:effectRef idx="0">
+            <a:schemeClr val="accent1"/>
+          </a:effectRef>
+          <a:fontRef idx="minor">
+            <a:schemeClr val="tx1"/>
+          </a:fontRef>
+        </p:style>
+      </p:cxnSp>
+      <p:cxnSp>
+        <p:nvCxnSpPr>
+          <p:cNvPr id="11" name="Straight Connector 10">
+            <a:extLst>
+              <a:ext uri="{FF2B5EF4-FFF2-40B4-BE49-F238E27FC236}">
+                <a16:creationId xmlns:a16="http://schemas.microsoft.com/office/drawing/2014/main" id="{D24A2F27-F7BE-EDD0-B5D2-BB93D40D6ED5}"/>
+              </a:ext>
+            </a:extLst>
+          </p:cNvPr>
+          <p:cNvCxnSpPr/>
+          <p:nvPr/>
+        </p:nvCxnSpPr>
+        <p:spPr>
+          <a:xfrm>
+            <a:off x="7145642" y="2071021"/>
+            <a:ext cx="387561" cy="0"/>
+          </a:xfrm>
+          <a:prstGeom prst="line">
+            <a:avLst/>
+          </a:prstGeom>
+        </p:spPr>
+        <p:style>
+          <a:lnRef idx="1">
+            <a:schemeClr val="accent1"/>
+          </a:lnRef>
+          <a:fillRef idx="0">
+            <a:schemeClr val="accent1"/>
+          </a:fillRef>
+          <a:effectRef idx="0">
+            <a:schemeClr val="accent1"/>
+          </a:effectRef>
+          <a:fontRef idx="minor">
+            <a:schemeClr val="tx1"/>
+          </a:fontRef>
+        </p:style>
+      </p:cxnSp>
+      <p:grpSp>
+        <p:nvGrpSpPr>
+          <p:cNvPr id="2" name="Group 1">
+            <a:extLst>
+              <a:ext uri="{FF2B5EF4-FFF2-40B4-BE49-F238E27FC236}">
+                <a16:creationId xmlns:a16="http://schemas.microsoft.com/office/drawing/2014/main" id="{06BCE9A7-D0F7-1BA7-A7C2-C79A30BC5A37}"/>
+              </a:ext>
+            </a:extLst>
+          </p:cNvPr>
+          <p:cNvGrpSpPr/>
+          <p:nvPr/>
+        </p:nvGrpSpPr>
+        <p:grpSpPr>
+          <a:xfrm>
+            <a:off x="1749872" y="2456244"/>
+            <a:ext cx="1343440" cy="520592"/>
+            <a:chOff x="1662271" y="2488864"/>
+            <a:chExt cx="1374627" cy="484451"/>
+          </a:xfrm>
+        </p:grpSpPr>
+        <p:sp>
+          <p:nvSpPr>
+            <p:cNvPr id="12" name="Rectangle: Rounded Corners 11">
+              <a:extLst>
+                <a:ext uri="{FF2B5EF4-FFF2-40B4-BE49-F238E27FC236}">
+                  <a16:creationId xmlns:a16="http://schemas.microsoft.com/office/drawing/2014/main" id="{90C460BF-4971-33AC-2FA8-1D33B4138DBA}"/>
+                </a:ext>
+              </a:extLst>
+            </p:cNvPr>
+            <p:cNvSpPr/>
+            <p:nvPr/>
+          </p:nvSpPr>
+          <p:spPr>
+            <a:xfrm>
+              <a:off x="1662271" y="2488864"/>
+              <a:ext cx="1374627" cy="484451"/>
+            </a:xfrm>
+            <a:prstGeom prst="roundRect">
+              <a:avLst/>
+            </a:prstGeom>
+            <a:noFill/>
+          </p:spPr>
+          <p:style>
+            <a:lnRef idx="2">
+              <a:schemeClr val="accent1">
+                <a:shade val="50000"/>
+              </a:schemeClr>
+            </a:lnRef>
+            <a:fillRef idx="1">
+              <a:schemeClr val="accent1"/>
+            </a:fillRef>
+            <a:effectRef idx="0">
+              <a:schemeClr val="accent1"/>
+            </a:effectRef>
+            <a:fontRef idx="minor">
+              <a:schemeClr val="lt1"/>
+            </a:fontRef>
+          </p:style>
+          <p:txBody>
+            <a:bodyPr rtlCol="0" anchor="ctr"/>
+            <a:lstStyle/>
+            <a:p>
+              <a:pPr algn="ctr"/>
+              <a:endParaRPr lang="en-CA"/>
+            </a:p>
+          </p:txBody>
+        </p:sp>
+        <p:sp>
+          <p:nvSpPr>
+            <p:cNvPr id="13" name="TextBox 12">
+              <a:extLst>
+                <a:ext uri="{FF2B5EF4-FFF2-40B4-BE49-F238E27FC236}">
+                  <a16:creationId xmlns:a16="http://schemas.microsoft.com/office/drawing/2014/main" id="{8FB3877F-BB30-AA54-232C-022528ED970F}"/>
+                </a:ext>
+              </a:extLst>
+            </p:cNvPr>
+            <p:cNvSpPr txBox="1"/>
+            <p:nvPr/>
+          </p:nvSpPr>
+          <p:spPr>
+            <a:xfrm>
+              <a:off x="1795503" y="2515645"/>
+              <a:ext cx="997389" cy="430887"/>
+            </a:xfrm>
+            <a:prstGeom prst="rect">
+              <a:avLst/>
+            </a:prstGeom>
+            <a:noFill/>
+          </p:spPr>
+          <p:txBody>
+            <a:bodyPr wrap="none" rtlCol="0">
+              <a:spAutoFit/>
+            </a:bodyPr>
+            <a:lstStyle/>
+            <a:p>
+              <a:pPr algn="ctr"/>
+              <a:r>
+                <a:rPr lang="en-CA" sz="1100" dirty="0"/>
+                <a:t>Show me all </a:t>
+              </a:r>
+            </a:p>
+            <a:p>
+              <a:pPr algn="ctr"/>
+              <a:r>
+                <a:rPr lang="en-CA" sz="1100" dirty="0"/>
+                <a:t>Appointments</a:t>
+              </a:r>
+            </a:p>
+          </p:txBody>
+        </p:sp>
+      </p:grpSp>
+      <p:sp>
+        <p:nvSpPr>
+          <p:cNvPr id="14" name="Rectangle 13">
+            <a:extLst>
+              <a:ext uri="{FF2B5EF4-FFF2-40B4-BE49-F238E27FC236}">
+                <a16:creationId xmlns:a16="http://schemas.microsoft.com/office/drawing/2014/main" id="{45488D2F-DF9C-0A51-91A4-9F2E3823728F}"/>
+              </a:ext>
+            </a:extLst>
+          </p:cNvPr>
+          <p:cNvSpPr/>
+          <p:nvPr/>
+        </p:nvSpPr>
+        <p:spPr>
+          <a:xfrm>
+            <a:off x="3512264" y="2416192"/>
+            <a:ext cx="4166273" cy="3015703"/>
+          </a:xfrm>
+          <a:prstGeom prst="rect">
+            <a:avLst/>
+          </a:prstGeom>
+          <a:noFill/>
+        </p:spPr>
+        <p:style>
+          <a:lnRef idx="2">
+            <a:schemeClr val="accent1">
+              <a:shade val="50000"/>
+            </a:schemeClr>
+          </a:lnRef>
+          <a:fillRef idx="1">
+            <a:schemeClr val="accent1"/>
+          </a:fillRef>
+          <a:effectRef idx="0">
+            <a:schemeClr val="accent1"/>
+          </a:effectRef>
+          <a:fontRef idx="minor">
+            <a:schemeClr val="lt1"/>
+          </a:fontRef>
+        </p:style>
+        <p:txBody>
+          <a:bodyPr rtlCol="0" anchor="ctr"/>
+          <a:lstStyle/>
+          <a:p>
+            <a:pPr algn="ctr"/>
+            <a:endParaRPr lang="en-CA"/>
+          </a:p>
+        </p:txBody>
+      </p:sp>
+      <p:sp>
+        <p:nvSpPr>
+          <p:cNvPr id="15" name="TextBox 14">
+            <a:extLst>
+              <a:ext uri="{FF2B5EF4-FFF2-40B4-BE49-F238E27FC236}">
+                <a16:creationId xmlns:a16="http://schemas.microsoft.com/office/drawing/2014/main" id="{29A2FCD0-29D2-9C67-D8E7-69C9C184ABDF}"/>
+              </a:ext>
+            </a:extLst>
+          </p:cNvPr>
+          <p:cNvSpPr txBox="1"/>
+          <p:nvPr/>
+        </p:nvSpPr>
+        <p:spPr>
+          <a:xfrm>
+            <a:off x="2105584" y="1288610"/>
+            <a:ext cx="2574359" cy="646331"/>
+          </a:xfrm>
+          <a:prstGeom prst="rect">
+            <a:avLst/>
+          </a:prstGeom>
+          <a:noFill/>
+        </p:spPr>
+        <p:txBody>
+          <a:bodyPr wrap="none" rtlCol="0">
+            <a:spAutoFit/>
+          </a:bodyPr>
+          <a:lstStyle/>
+          <a:p>
+            <a:r>
+              <a:rPr lang="en-CA" dirty="0"/>
+              <a:t>Main page</a:t>
+            </a:r>
+          </a:p>
+          <a:p>
+            <a:r>
+              <a:rPr lang="en-CA" dirty="0"/>
+              <a:t>With list of appointments</a:t>
+            </a:r>
+          </a:p>
+        </p:txBody>
+      </p:sp>
+      <p:grpSp>
+        <p:nvGrpSpPr>
+          <p:cNvPr id="3" name="Group 2">
+            <a:extLst>
+              <a:ext uri="{FF2B5EF4-FFF2-40B4-BE49-F238E27FC236}">
+                <a16:creationId xmlns:a16="http://schemas.microsoft.com/office/drawing/2014/main" id="{6BDFC24D-C15D-5116-8278-3310EA0E4B8C}"/>
+              </a:ext>
+            </a:extLst>
+          </p:cNvPr>
+          <p:cNvGrpSpPr/>
+          <p:nvPr/>
+        </p:nvGrpSpPr>
+        <p:grpSpPr>
+          <a:xfrm>
+            <a:off x="1710062" y="3428999"/>
+            <a:ext cx="1372253" cy="484037"/>
+            <a:chOff x="6008194" y="4774859"/>
+            <a:chExt cx="1374627" cy="497998"/>
+          </a:xfrm>
+        </p:grpSpPr>
+        <p:sp>
+          <p:nvSpPr>
+            <p:cNvPr id="16" name="Rectangle: Rounded Corners 15">
+              <a:extLst>
+                <a:ext uri="{FF2B5EF4-FFF2-40B4-BE49-F238E27FC236}">
+                  <a16:creationId xmlns:a16="http://schemas.microsoft.com/office/drawing/2014/main" id="{B4FFC496-018F-2087-117B-D26F9558CEF2}"/>
+                </a:ext>
+              </a:extLst>
+            </p:cNvPr>
+            <p:cNvSpPr/>
+            <p:nvPr/>
+          </p:nvSpPr>
+          <p:spPr>
+            <a:xfrm>
+              <a:off x="6008194" y="4774859"/>
+              <a:ext cx="1374627" cy="484451"/>
+            </a:xfrm>
+            <a:prstGeom prst="roundRect">
+              <a:avLst/>
+            </a:prstGeom>
+            <a:noFill/>
+          </p:spPr>
+          <p:style>
+            <a:lnRef idx="2">
+              <a:schemeClr val="accent1">
+                <a:shade val="50000"/>
+              </a:schemeClr>
+            </a:lnRef>
+            <a:fillRef idx="1">
+              <a:schemeClr val="accent1"/>
+            </a:fillRef>
+            <a:effectRef idx="0">
+              <a:schemeClr val="accent1"/>
+            </a:effectRef>
+            <a:fontRef idx="minor">
+              <a:schemeClr val="lt1"/>
+            </a:fontRef>
+          </p:style>
+          <p:txBody>
+            <a:bodyPr rtlCol="0" anchor="ctr"/>
+            <a:lstStyle/>
+            <a:p>
+              <a:pPr algn="ctr"/>
+              <a:endParaRPr lang="en-CA"/>
+            </a:p>
+          </p:txBody>
+        </p:sp>
+        <p:sp>
+          <p:nvSpPr>
+            <p:cNvPr id="17" name="TextBox 16">
+              <a:extLst>
+                <a:ext uri="{FF2B5EF4-FFF2-40B4-BE49-F238E27FC236}">
+                  <a16:creationId xmlns:a16="http://schemas.microsoft.com/office/drawing/2014/main" id="{116E42F5-A7D7-0E72-E38B-36C40EE3B91E}"/>
+                </a:ext>
+              </a:extLst>
+            </p:cNvPr>
+            <p:cNvSpPr txBox="1"/>
+            <p:nvPr/>
+          </p:nvSpPr>
+          <p:spPr>
+            <a:xfrm>
+              <a:off x="6048073" y="4811192"/>
+              <a:ext cx="1333634" cy="461665"/>
+            </a:xfrm>
+            <a:prstGeom prst="rect">
+              <a:avLst/>
+            </a:prstGeom>
+            <a:noFill/>
+          </p:spPr>
+          <p:txBody>
+            <a:bodyPr wrap="none" rtlCol="0">
+              <a:spAutoFit/>
+            </a:bodyPr>
+            <a:lstStyle/>
+            <a:p>
+              <a:pPr algn="ctr"/>
+              <a:r>
+                <a:rPr lang="en-CA" sz="1200" dirty="0"/>
+                <a:t>Add </a:t>
+              </a:r>
+            </a:p>
+            <a:p>
+              <a:pPr algn="ctr"/>
+              <a:r>
+                <a:rPr lang="en-CA" sz="1200" dirty="0"/>
+                <a:t>New Appointment</a:t>
+              </a:r>
+            </a:p>
+          </p:txBody>
+        </p:sp>
+      </p:grpSp>
+      <p:sp>
+        <p:nvSpPr>
+          <p:cNvPr id="18" name="Rectangle 17">
+            <a:extLst>
+              <a:ext uri="{FF2B5EF4-FFF2-40B4-BE49-F238E27FC236}">
+                <a16:creationId xmlns:a16="http://schemas.microsoft.com/office/drawing/2014/main" id="{7CAB7197-E4C5-161A-BCFC-6368648AF9BA}"/>
+              </a:ext>
+            </a:extLst>
+          </p:cNvPr>
+          <p:cNvSpPr/>
+          <p:nvPr/>
+        </p:nvSpPr>
+        <p:spPr>
+          <a:xfrm>
+            <a:off x="1259571" y="5574207"/>
+            <a:ext cx="6418967" cy="638746"/>
+          </a:xfrm>
+          <a:prstGeom prst="rect">
+            <a:avLst/>
+          </a:prstGeom>
+          <a:noFill/>
+          <a:ln>
+            <a:solidFill>
+              <a:srgbClr val="CE9178"/>
+            </a:solidFill>
+          </a:ln>
+        </p:spPr>
+        <p:style>
+          <a:lnRef idx="2">
+            <a:schemeClr val="accent1">
+              <a:shade val="50000"/>
+            </a:schemeClr>
+          </a:lnRef>
+          <a:fillRef idx="1">
+            <a:schemeClr val="accent1"/>
+          </a:fillRef>
+          <a:effectRef idx="0">
+            <a:schemeClr val="accent1"/>
+          </a:effectRef>
+          <a:fontRef idx="minor">
+            <a:schemeClr val="lt1"/>
+          </a:fontRef>
+        </p:style>
+        <p:txBody>
+          <a:bodyPr rtlCol="0" anchor="ctr"/>
+          <a:lstStyle/>
+          <a:p>
+            <a:pPr algn="ctr"/>
+            <a:endParaRPr lang="en-CA"/>
+          </a:p>
+        </p:txBody>
+      </p:sp>
+      <p:sp>
+        <p:nvSpPr>
+          <p:cNvPr id="19" name="TextBox 18">
+            <a:extLst>
+              <a:ext uri="{FF2B5EF4-FFF2-40B4-BE49-F238E27FC236}">
+                <a16:creationId xmlns:a16="http://schemas.microsoft.com/office/drawing/2014/main" id="{9DE6D796-9483-ADC1-9CDA-12CFB0B2F40E}"/>
+              </a:ext>
+            </a:extLst>
+          </p:cNvPr>
+          <p:cNvSpPr txBox="1"/>
+          <p:nvPr/>
+        </p:nvSpPr>
+        <p:spPr>
+          <a:xfrm>
+            <a:off x="1702373" y="5634825"/>
+            <a:ext cx="763992" cy="369332"/>
+          </a:xfrm>
+          <a:prstGeom prst="rect">
+            <a:avLst/>
+          </a:prstGeom>
+          <a:noFill/>
+        </p:spPr>
+        <p:txBody>
+          <a:bodyPr wrap="none" rtlCol="0">
+            <a:spAutoFit/>
+          </a:bodyPr>
+          <a:lstStyle/>
+          <a:p>
+            <a:r>
+              <a:rPr lang="en-CA" dirty="0"/>
+              <a:t>footer</a:t>
+            </a:r>
+          </a:p>
+        </p:txBody>
+      </p:sp>
+      <p:sp>
+        <p:nvSpPr>
+          <p:cNvPr id="7" name="Rectangle 6">
+            <a:extLst>
+              <a:ext uri="{FF2B5EF4-FFF2-40B4-BE49-F238E27FC236}">
+                <a16:creationId xmlns:a16="http://schemas.microsoft.com/office/drawing/2014/main" id="{8B5A46A8-367F-3516-BCF8-57E5B30D7991}"/>
+              </a:ext>
+            </a:extLst>
+          </p:cNvPr>
+          <p:cNvSpPr/>
+          <p:nvPr/>
+        </p:nvSpPr>
+        <p:spPr>
+          <a:xfrm>
+            <a:off x="1259571" y="2397902"/>
+            <a:ext cx="2167913" cy="3015703"/>
+          </a:xfrm>
+          <a:prstGeom prst="rect">
+            <a:avLst/>
+          </a:prstGeom>
+          <a:noFill/>
+        </p:spPr>
+        <p:style>
+          <a:lnRef idx="2">
+            <a:schemeClr val="accent1">
+              <a:shade val="50000"/>
+            </a:schemeClr>
+          </a:lnRef>
+          <a:fillRef idx="1">
+            <a:schemeClr val="accent1"/>
+          </a:fillRef>
+          <a:effectRef idx="0">
+            <a:schemeClr val="accent1"/>
+          </a:effectRef>
+          <a:fontRef idx="minor">
+            <a:schemeClr val="lt1"/>
+          </a:fontRef>
+        </p:style>
+        <p:txBody>
+          <a:bodyPr rtlCol="0" anchor="ctr"/>
+          <a:lstStyle/>
+          <a:p>
+            <a:pPr algn="ctr"/>
+            <a:endParaRPr lang="en-CA"/>
+          </a:p>
+        </p:txBody>
+      </p:sp>
+      <p:sp>
+        <p:nvSpPr>
+          <p:cNvPr id="20" name="TextBox 19">
+            <a:extLst>
+              <a:ext uri="{FF2B5EF4-FFF2-40B4-BE49-F238E27FC236}">
+                <a16:creationId xmlns:a16="http://schemas.microsoft.com/office/drawing/2014/main" id="{EEA9051A-857B-AF7C-CF7C-11D1D4F2F3BC}"/>
+              </a:ext>
+            </a:extLst>
+          </p:cNvPr>
+          <p:cNvSpPr txBox="1"/>
+          <p:nvPr/>
+        </p:nvSpPr>
+        <p:spPr>
+          <a:xfrm>
+            <a:off x="1413334" y="3028262"/>
+            <a:ext cx="1872500" cy="338554"/>
+          </a:xfrm>
+          <a:prstGeom prst="rect">
+            <a:avLst/>
+          </a:prstGeom>
+          <a:noFill/>
+        </p:spPr>
+        <p:txBody>
+          <a:bodyPr wrap="none" rtlCol="0">
+            <a:spAutoFit/>
+          </a:bodyPr>
+          <a:lstStyle/>
+          <a:p>
+            <a:r>
+              <a:rPr lang="en-CA" sz="1600" dirty="0"/>
+              <a:t>User input/interface</a:t>
+            </a:r>
+          </a:p>
+        </p:txBody>
+      </p:sp>
+      <p:grpSp>
+        <p:nvGrpSpPr>
+          <p:cNvPr id="25" name="Group 24">
+            <a:extLst>
+              <a:ext uri="{FF2B5EF4-FFF2-40B4-BE49-F238E27FC236}">
+                <a16:creationId xmlns:a16="http://schemas.microsoft.com/office/drawing/2014/main" id="{0B1C2961-EC2D-F2EC-28B5-66A68C691DF8}"/>
+              </a:ext>
+            </a:extLst>
+          </p:cNvPr>
+          <p:cNvGrpSpPr/>
+          <p:nvPr/>
+        </p:nvGrpSpPr>
+        <p:grpSpPr>
+          <a:xfrm>
+            <a:off x="3760546" y="2607504"/>
+            <a:ext cx="3772657" cy="369332"/>
+            <a:chOff x="3760546" y="2607504"/>
+            <a:chExt cx="3772657" cy="369332"/>
+          </a:xfrm>
+        </p:grpSpPr>
+        <p:sp>
+          <p:nvSpPr>
+            <p:cNvPr id="21" name="Rectangle 20">
+              <a:extLst>
+                <a:ext uri="{FF2B5EF4-FFF2-40B4-BE49-F238E27FC236}">
+                  <a16:creationId xmlns:a16="http://schemas.microsoft.com/office/drawing/2014/main" id="{91E4C56D-6E6D-3AD5-F7E8-5EE52CB277CD}"/>
+                </a:ext>
+              </a:extLst>
+            </p:cNvPr>
+            <p:cNvSpPr/>
+            <p:nvPr/>
+          </p:nvSpPr>
+          <p:spPr>
+            <a:xfrm>
+              <a:off x="3760546" y="2607504"/>
+              <a:ext cx="3772657" cy="369332"/>
+            </a:xfrm>
+            <a:prstGeom prst="rect">
+              <a:avLst/>
+            </a:prstGeom>
+            <a:solidFill>
+              <a:schemeClr val="bg1">
+                <a:lumMod val="95000"/>
+              </a:schemeClr>
+            </a:solidFill>
+            <a:ln>
+              <a:solidFill>
+                <a:srgbClr val="CE9178"/>
+              </a:solidFill>
+            </a:ln>
+          </p:spPr>
+          <p:style>
+            <a:lnRef idx="2">
+              <a:schemeClr val="accent1">
+                <a:shade val="50000"/>
+              </a:schemeClr>
+            </a:lnRef>
+            <a:fillRef idx="1">
+              <a:schemeClr val="accent1"/>
+            </a:fillRef>
+            <a:effectRef idx="0">
+              <a:schemeClr val="accent1"/>
+            </a:effectRef>
+            <a:fontRef idx="minor">
+              <a:schemeClr val="lt1"/>
+            </a:fontRef>
+          </p:style>
+          <p:txBody>
+            <a:bodyPr rtlCol="0" anchor="ctr"/>
+            <a:lstStyle/>
+            <a:p>
+              <a:pPr algn="ctr"/>
+              <a:endParaRPr lang="en-CA" dirty="0">
+                <a:ln>
+                  <a:solidFill>
+                    <a:srgbClr val="3B3838"/>
+                  </a:solidFill>
+                </a:ln>
+              </a:endParaRPr>
+            </a:p>
+          </p:txBody>
+        </p:sp>
+        <p:sp>
+          <p:nvSpPr>
+            <p:cNvPr id="23" name="TextBox 22">
+              <a:extLst>
+                <a:ext uri="{FF2B5EF4-FFF2-40B4-BE49-F238E27FC236}">
+                  <a16:creationId xmlns:a16="http://schemas.microsoft.com/office/drawing/2014/main" id="{25D2E69C-36DF-6F91-B03A-B33C565E9EC2}"/>
+                </a:ext>
+              </a:extLst>
+            </p:cNvPr>
+            <p:cNvSpPr txBox="1"/>
+            <p:nvPr/>
+          </p:nvSpPr>
+          <p:spPr>
+            <a:xfrm>
+              <a:off x="3794508" y="2634095"/>
+              <a:ext cx="1595693" cy="276999"/>
+            </a:xfrm>
+            <a:prstGeom prst="rect">
+              <a:avLst/>
+            </a:prstGeom>
+            <a:noFill/>
+          </p:spPr>
+          <p:txBody>
+            <a:bodyPr wrap="none" rtlCol="0">
+              <a:spAutoFit/>
+            </a:bodyPr>
+            <a:lstStyle/>
+            <a:p>
+              <a:r>
+                <a:rPr lang="en-CA" sz="1200" dirty="0"/>
+                <a:t>Appointment # - name</a:t>
+              </a:r>
+            </a:p>
+          </p:txBody>
+        </p:sp>
+      </p:grpSp>
+      <p:sp>
+        <p:nvSpPr>
+          <p:cNvPr id="24" name="TextBox 23">
+            <a:extLst>
+              <a:ext uri="{FF2B5EF4-FFF2-40B4-BE49-F238E27FC236}">
+                <a16:creationId xmlns:a16="http://schemas.microsoft.com/office/drawing/2014/main" id="{A4049189-F769-234D-7D4E-A82F7897B89E}"/>
+              </a:ext>
+            </a:extLst>
+          </p:cNvPr>
+          <p:cNvSpPr txBox="1"/>
+          <p:nvPr/>
+        </p:nvSpPr>
+        <p:spPr>
+          <a:xfrm>
+            <a:off x="6412911" y="2647697"/>
+            <a:ext cx="1186736" cy="230832"/>
+          </a:xfrm>
+          <a:prstGeom prst="rect">
+            <a:avLst/>
+          </a:prstGeom>
+          <a:noFill/>
+        </p:spPr>
+        <p:txBody>
+          <a:bodyPr wrap="square" rtlCol="0">
+            <a:spAutoFit/>
+          </a:bodyPr>
+          <a:lstStyle/>
+          <a:p>
+            <a:pPr>
+              <a:tabLst>
+                <a:tab pos="714375" algn="l"/>
+              </a:tabLst>
+            </a:pPr>
+            <a:r>
+              <a:rPr lang="en-CA" sz="900" dirty="0"/>
+              <a:t>Date	icon</a:t>
+            </a:r>
+          </a:p>
+        </p:txBody>
+      </p:sp>
+      <p:grpSp>
+        <p:nvGrpSpPr>
+          <p:cNvPr id="26" name="Group 25">
+            <a:extLst>
+              <a:ext uri="{FF2B5EF4-FFF2-40B4-BE49-F238E27FC236}">
+                <a16:creationId xmlns:a16="http://schemas.microsoft.com/office/drawing/2014/main" id="{72489CD0-05F2-19BD-2CB3-09788A618EA0}"/>
+              </a:ext>
+            </a:extLst>
+          </p:cNvPr>
+          <p:cNvGrpSpPr/>
+          <p:nvPr/>
+        </p:nvGrpSpPr>
+        <p:grpSpPr>
+          <a:xfrm>
+            <a:off x="3754633" y="3099133"/>
+            <a:ext cx="3772657" cy="369332"/>
+            <a:chOff x="3760546" y="2607504"/>
+            <a:chExt cx="3772657" cy="369332"/>
+          </a:xfrm>
+        </p:grpSpPr>
+        <p:sp>
+          <p:nvSpPr>
+            <p:cNvPr id="27" name="Rectangle 26">
+              <a:extLst>
+                <a:ext uri="{FF2B5EF4-FFF2-40B4-BE49-F238E27FC236}">
+                  <a16:creationId xmlns:a16="http://schemas.microsoft.com/office/drawing/2014/main" id="{2BAA3D76-589A-FD92-729E-225931E7DD94}"/>
+                </a:ext>
+              </a:extLst>
+            </p:cNvPr>
+            <p:cNvSpPr/>
+            <p:nvPr/>
+          </p:nvSpPr>
+          <p:spPr>
+            <a:xfrm>
+              <a:off x="3760546" y="2607504"/>
+              <a:ext cx="3772657" cy="369332"/>
+            </a:xfrm>
+            <a:prstGeom prst="rect">
+              <a:avLst/>
+            </a:prstGeom>
+            <a:solidFill>
+              <a:schemeClr val="bg1">
+                <a:lumMod val="95000"/>
+              </a:schemeClr>
+            </a:solidFill>
+            <a:ln>
+              <a:solidFill>
+                <a:srgbClr val="CE9178"/>
+              </a:solidFill>
+            </a:ln>
+          </p:spPr>
+          <p:style>
+            <a:lnRef idx="2">
+              <a:schemeClr val="accent1">
+                <a:shade val="50000"/>
+              </a:schemeClr>
+            </a:lnRef>
+            <a:fillRef idx="1">
+              <a:schemeClr val="accent1"/>
+            </a:fillRef>
+            <a:effectRef idx="0">
+              <a:schemeClr val="accent1"/>
+            </a:effectRef>
+            <a:fontRef idx="minor">
+              <a:schemeClr val="lt1"/>
+            </a:fontRef>
+          </p:style>
+          <p:txBody>
+            <a:bodyPr rtlCol="0" anchor="ctr"/>
+            <a:lstStyle/>
+            <a:p>
+              <a:pPr algn="ctr"/>
+              <a:endParaRPr lang="en-CA" dirty="0">
+                <a:ln>
+                  <a:solidFill>
+                    <a:srgbClr val="3B3838"/>
+                  </a:solidFill>
+                </a:ln>
+              </a:endParaRPr>
+            </a:p>
+          </p:txBody>
+        </p:sp>
+        <p:sp>
+          <p:nvSpPr>
+            <p:cNvPr id="28" name="TextBox 27">
+              <a:extLst>
+                <a:ext uri="{FF2B5EF4-FFF2-40B4-BE49-F238E27FC236}">
+                  <a16:creationId xmlns:a16="http://schemas.microsoft.com/office/drawing/2014/main" id="{901BCDA2-D74A-32DD-F5F5-632545E8E42A}"/>
+                </a:ext>
+              </a:extLst>
+            </p:cNvPr>
+            <p:cNvSpPr txBox="1"/>
+            <p:nvPr/>
+          </p:nvSpPr>
+          <p:spPr>
+            <a:xfrm>
+              <a:off x="3794508" y="2634095"/>
+              <a:ext cx="1595693" cy="276999"/>
+            </a:xfrm>
+            <a:prstGeom prst="rect">
+              <a:avLst/>
+            </a:prstGeom>
+            <a:noFill/>
+          </p:spPr>
+          <p:txBody>
+            <a:bodyPr wrap="none" rtlCol="0">
+              <a:spAutoFit/>
+            </a:bodyPr>
+            <a:lstStyle/>
+            <a:p>
+              <a:r>
+                <a:rPr lang="en-CA" sz="1200" dirty="0"/>
+                <a:t>Appointment # - name</a:t>
+              </a:r>
+            </a:p>
+          </p:txBody>
+        </p:sp>
+      </p:grpSp>
+      <p:grpSp>
+        <p:nvGrpSpPr>
+          <p:cNvPr id="29" name="Group 28">
+            <a:extLst>
+              <a:ext uri="{FF2B5EF4-FFF2-40B4-BE49-F238E27FC236}">
+                <a16:creationId xmlns:a16="http://schemas.microsoft.com/office/drawing/2014/main" id="{C2053FF4-2041-857B-C6A2-C9EC31F13C27}"/>
+              </a:ext>
+            </a:extLst>
+          </p:cNvPr>
+          <p:cNvGrpSpPr/>
+          <p:nvPr/>
+        </p:nvGrpSpPr>
+        <p:grpSpPr>
+          <a:xfrm>
+            <a:off x="3753847" y="3609447"/>
+            <a:ext cx="3772657" cy="369332"/>
+            <a:chOff x="3760546" y="2607504"/>
+            <a:chExt cx="3772657" cy="369332"/>
+          </a:xfrm>
+        </p:grpSpPr>
+        <p:sp>
+          <p:nvSpPr>
+            <p:cNvPr id="30" name="Rectangle 29">
+              <a:extLst>
+                <a:ext uri="{FF2B5EF4-FFF2-40B4-BE49-F238E27FC236}">
+                  <a16:creationId xmlns:a16="http://schemas.microsoft.com/office/drawing/2014/main" id="{43B5267C-972C-6C0C-AB0F-6607C5B5C1DD}"/>
+                </a:ext>
+              </a:extLst>
+            </p:cNvPr>
+            <p:cNvSpPr/>
+            <p:nvPr/>
+          </p:nvSpPr>
+          <p:spPr>
+            <a:xfrm>
+              <a:off x="3760546" y="2607504"/>
+              <a:ext cx="3772657" cy="369332"/>
+            </a:xfrm>
+            <a:prstGeom prst="rect">
+              <a:avLst/>
+            </a:prstGeom>
+            <a:solidFill>
+              <a:schemeClr val="bg1">
+                <a:lumMod val="95000"/>
+              </a:schemeClr>
+            </a:solidFill>
+            <a:ln>
+              <a:solidFill>
+                <a:srgbClr val="CE9178"/>
+              </a:solidFill>
+            </a:ln>
+          </p:spPr>
+          <p:style>
+            <a:lnRef idx="2">
+              <a:schemeClr val="accent1">
+                <a:shade val="50000"/>
+              </a:schemeClr>
+            </a:lnRef>
+            <a:fillRef idx="1">
+              <a:schemeClr val="accent1"/>
+            </a:fillRef>
+            <a:effectRef idx="0">
+              <a:schemeClr val="accent1"/>
+            </a:effectRef>
+            <a:fontRef idx="minor">
+              <a:schemeClr val="lt1"/>
+            </a:fontRef>
+          </p:style>
+          <p:txBody>
+            <a:bodyPr rtlCol="0" anchor="ctr"/>
+            <a:lstStyle/>
+            <a:p>
+              <a:pPr algn="ctr"/>
+              <a:endParaRPr lang="en-CA" dirty="0">
+                <a:ln>
+                  <a:solidFill>
+                    <a:srgbClr val="3B3838"/>
+                  </a:solidFill>
+                </a:ln>
+              </a:endParaRPr>
+            </a:p>
+          </p:txBody>
+        </p:sp>
+        <p:sp>
+          <p:nvSpPr>
+            <p:cNvPr id="31" name="TextBox 30">
+              <a:extLst>
+                <a:ext uri="{FF2B5EF4-FFF2-40B4-BE49-F238E27FC236}">
+                  <a16:creationId xmlns:a16="http://schemas.microsoft.com/office/drawing/2014/main" id="{57F1140A-7875-BD65-9119-D0C32BC8298C}"/>
+                </a:ext>
+              </a:extLst>
+            </p:cNvPr>
+            <p:cNvSpPr txBox="1"/>
+            <p:nvPr/>
+          </p:nvSpPr>
+          <p:spPr>
+            <a:xfrm>
+              <a:off x="3794508" y="2634095"/>
+              <a:ext cx="1595693" cy="276999"/>
+            </a:xfrm>
+            <a:prstGeom prst="rect">
+              <a:avLst/>
+            </a:prstGeom>
+            <a:noFill/>
+          </p:spPr>
+          <p:txBody>
+            <a:bodyPr wrap="none" rtlCol="0">
+              <a:spAutoFit/>
+            </a:bodyPr>
+            <a:lstStyle/>
+            <a:p>
+              <a:r>
+                <a:rPr lang="en-CA" sz="1200" dirty="0"/>
+                <a:t>Appointment # - name</a:t>
+              </a:r>
+            </a:p>
+          </p:txBody>
+        </p:sp>
+      </p:grpSp>
+      <p:grpSp>
+        <p:nvGrpSpPr>
+          <p:cNvPr id="32" name="Group 31">
+            <a:extLst>
+              <a:ext uri="{FF2B5EF4-FFF2-40B4-BE49-F238E27FC236}">
+                <a16:creationId xmlns:a16="http://schemas.microsoft.com/office/drawing/2014/main" id="{2FFE579D-446C-6DC1-FC5D-B15E68455A05}"/>
+              </a:ext>
+            </a:extLst>
+          </p:cNvPr>
+          <p:cNvGrpSpPr/>
+          <p:nvPr/>
+        </p:nvGrpSpPr>
+        <p:grpSpPr>
+          <a:xfrm>
+            <a:off x="3760546" y="4101076"/>
+            <a:ext cx="3772657" cy="369332"/>
+            <a:chOff x="3760546" y="2607504"/>
+            <a:chExt cx="3772657" cy="369332"/>
+          </a:xfrm>
+        </p:grpSpPr>
+        <p:sp>
+          <p:nvSpPr>
+            <p:cNvPr id="33" name="Rectangle 32">
+              <a:extLst>
+                <a:ext uri="{FF2B5EF4-FFF2-40B4-BE49-F238E27FC236}">
+                  <a16:creationId xmlns:a16="http://schemas.microsoft.com/office/drawing/2014/main" id="{FBAC9D95-347C-A510-D0AA-DFA7B1ACB707}"/>
+                </a:ext>
+              </a:extLst>
+            </p:cNvPr>
+            <p:cNvSpPr/>
+            <p:nvPr/>
+          </p:nvSpPr>
+          <p:spPr>
+            <a:xfrm>
+              <a:off x="3760546" y="2607504"/>
+              <a:ext cx="3772657" cy="369332"/>
+            </a:xfrm>
+            <a:prstGeom prst="rect">
+              <a:avLst/>
+            </a:prstGeom>
+            <a:solidFill>
+              <a:schemeClr val="bg1">
+                <a:lumMod val="95000"/>
+              </a:schemeClr>
+            </a:solidFill>
+            <a:ln>
+              <a:solidFill>
+                <a:srgbClr val="CE9178"/>
+              </a:solidFill>
+            </a:ln>
+          </p:spPr>
+          <p:style>
+            <a:lnRef idx="2">
+              <a:schemeClr val="accent1">
+                <a:shade val="50000"/>
+              </a:schemeClr>
+            </a:lnRef>
+            <a:fillRef idx="1">
+              <a:schemeClr val="accent1"/>
+            </a:fillRef>
+            <a:effectRef idx="0">
+              <a:schemeClr val="accent1"/>
+            </a:effectRef>
+            <a:fontRef idx="minor">
+              <a:schemeClr val="lt1"/>
+            </a:fontRef>
+          </p:style>
+          <p:txBody>
+            <a:bodyPr rtlCol="0" anchor="ctr"/>
+            <a:lstStyle/>
+            <a:p>
+              <a:pPr algn="ctr"/>
+              <a:endParaRPr lang="en-CA" dirty="0">
+                <a:ln>
+                  <a:solidFill>
+                    <a:srgbClr val="3B3838"/>
+                  </a:solidFill>
+                </a:ln>
+              </a:endParaRPr>
+            </a:p>
+          </p:txBody>
+        </p:sp>
+        <p:sp>
+          <p:nvSpPr>
+            <p:cNvPr id="34" name="TextBox 33">
+              <a:extLst>
+                <a:ext uri="{FF2B5EF4-FFF2-40B4-BE49-F238E27FC236}">
+                  <a16:creationId xmlns:a16="http://schemas.microsoft.com/office/drawing/2014/main" id="{38DC9F46-391F-3863-A4A0-7A693E75569B}"/>
+                </a:ext>
+              </a:extLst>
+            </p:cNvPr>
+            <p:cNvSpPr txBox="1"/>
+            <p:nvPr/>
+          </p:nvSpPr>
+          <p:spPr>
+            <a:xfrm>
+              <a:off x="3794508" y="2634095"/>
+              <a:ext cx="1595693" cy="276999"/>
+            </a:xfrm>
+            <a:prstGeom prst="rect">
+              <a:avLst/>
+            </a:prstGeom>
+            <a:noFill/>
+          </p:spPr>
+          <p:txBody>
+            <a:bodyPr wrap="none" rtlCol="0">
+              <a:spAutoFit/>
+            </a:bodyPr>
+            <a:lstStyle/>
+            <a:p>
+              <a:r>
+                <a:rPr lang="en-CA" sz="1200" dirty="0"/>
+                <a:t>Appointment # - name</a:t>
+              </a:r>
+            </a:p>
+          </p:txBody>
+        </p:sp>
+      </p:grpSp>
+      <p:sp>
+        <p:nvSpPr>
+          <p:cNvPr id="38" name="Arrow: Down 37">
+            <a:extLst>
+              <a:ext uri="{FF2B5EF4-FFF2-40B4-BE49-F238E27FC236}">
+                <a16:creationId xmlns:a16="http://schemas.microsoft.com/office/drawing/2014/main" id="{2892A914-9C88-B467-E0B3-F55B2D2CFCBF}"/>
+              </a:ext>
+            </a:extLst>
+          </p:cNvPr>
+          <p:cNvSpPr/>
+          <p:nvPr/>
+        </p:nvSpPr>
+        <p:spPr>
+          <a:xfrm>
+            <a:off x="1962277" y="4025559"/>
+            <a:ext cx="920201" cy="979424"/>
+          </a:xfrm>
+          <a:prstGeom prst="downArrow">
+            <a:avLst/>
+          </a:prstGeom>
+        </p:spPr>
+        <p:style>
+          <a:lnRef idx="2">
+            <a:schemeClr val="accent6">
+              <a:shade val="50000"/>
+            </a:schemeClr>
+          </a:lnRef>
+          <a:fillRef idx="1">
+            <a:schemeClr val="accent6"/>
+          </a:fillRef>
+          <a:effectRef idx="0">
+            <a:schemeClr val="accent6"/>
+          </a:effectRef>
+          <a:fontRef idx="minor">
+            <a:schemeClr val="lt1"/>
+          </a:fontRef>
+        </p:style>
+        <p:txBody>
+          <a:bodyPr rtlCol="0" anchor="ctr"/>
+          <a:lstStyle/>
+          <a:p>
+            <a:pPr algn="ctr"/>
+            <a:r>
+              <a:rPr lang="en-CA" sz="1000" dirty="0"/>
+              <a:t>Add info</a:t>
+            </a:r>
+          </a:p>
+        </p:txBody>
+      </p:sp>
+      <p:sp>
+        <p:nvSpPr>
+          <p:cNvPr id="39" name="Arrow: Right 38">
+            <a:extLst>
+              <a:ext uri="{FF2B5EF4-FFF2-40B4-BE49-F238E27FC236}">
+                <a16:creationId xmlns:a16="http://schemas.microsoft.com/office/drawing/2014/main" id="{BE68C50F-ED35-007A-D24C-9B1111A35EB4}"/>
+              </a:ext>
+            </a:extLst>
+          </p:cNvPr>
+          <p:cNvSpPr/>
+          <p:nvPr/>
+        </p:nvSpPr>
+        <p:spPr>
+          <a:xfrm>
+            <a:off x="7599647" y="3269920"/>
+            <a:ext cx="2404251" cy="755639"/>
+          </a:xfrm>
+          <a:prstGeom prst="rightArrow">
+            <a:avLst/>
+          </a:prstGeom>
+        </p:spPr>
+        <p:style>
+          <a:lnRef idx="2">
+            <a:schemeClr val="accent4">
+              <a:shade val="50000"/>
+            </a:schemeClr>
+          </a:lnRef>
+          <a:fillRef idx="1">
+            <a:schemeClr val="accent4"/>
+          </a:fillRef>
+          <a:effectRef idx="0">
+            <a:schemeClr val="accent4"/>
+          </a:effectRef>
+          <a:fontRef idx="minor">
+            <a:schemeClr val="lt1"/>
+          </a:fontRef>
+        </p:style>
+        <p:txBody>
+          <a:bodyPr rtlCol="0" anchor="ctr"/>
+          <a:lstStyle/>
+          <a:p>
+            <a:pPr algn="ctr"/>
+            <a:r>
+              <a:rPr lang="en-CA" dirty="0"/>
+              <a:t>Display </a:t>
+            </a:r>
+            <a:r>
+              <a:rPr lang="en-CA" dirty="0" err="1"/>
+              <a:t>appint</a:t>
+            </a:r>
+            <a:r>
+              <a:rPr lang="en-CA" dirty="0"/>
+              <a:t> info</a:t>
+            </a:r>
+          </a:p>
+        </p:txBody>
+      </p:sp>
+    </p:spTree>
+    <p:extLst>
+      <p:ext uri="{BB962C8B-B14F-4D97-AF65-F5344CB8AC3E}">
+        <p14:creationId xmlns:p14="http://schemas.microsoft.com/office/powerpoint/2010/main" val="3928897150"/>
       </p:ext>
     </p:extLst>
   </p:cSld>

</xml_diff>